<commit_message>
Implementations of various strategies under option 1
</commit_message>
<xml_diff>
--- a/preliminary_results.pptx
+++ b/preliminary_results.pptx
@@ -5,7 +5,7 @@
     <p:sldMasterId id="2147483648" r:id="rId1"/>
   </p:sldMasterIdLst>
   <p:notesMasterIdLst>
-    <p:notesMasterId r:id="rId8"/>
+    <p:notesMasterId r:id="rId19"/>
   </p:notesMasterIdLst>
   <p:sldIdLst>
     <p:sldId id="257" r:id="rId2"/>
@@ -14,6 +14,17 @@
     <p:sldId id="260" r:id="rId5"/>
     <p:sldId id="262" r:id="rId6"/>
     <p:sldId id="261" r:id="rId7"/>
+    <p:sldId id="263" r:id="rId8"/>
+    <p:sldId id="265" r:id="rId9"/>
+    <p:sldId id="266" r:id="rId10"/>
+    <p:sldId id="267" r:id="rId11"/>
+    <p:sldId id="268" r:id="rId12"/>
+    <p:sldId id="269" r:id="rId13"/>
+    <p:sldId id="270" r:id="rId14"/>
+    <p:sldId id="271" r:id="rId15"/>
+    <p:sldId id="272" r:id="rId16"/>
+    <p:sldId id="273" r:id="rId17"/>
+    <p:sldId id="275" r:id="rId18"/>
   </p:sldIdLst>
   <p:sldSz cx="12192000" cy="6858000"/>
   <p:notesSz cx="6858000" cy="9144000"/>
@@ -202,7 +213,7 @@
           <a:p>
             <a:fld id="{76CCFABF-3CA8-4256-B73B-5FC3FF2A7370}" type="datetimeFigureOut">
               <a:rPr lang="en-US" smtClean="0"/>
-              <a:t>11/17/2021</a:t>
+              <a:t>11/20/2021</a:t>
             </a:fld>
             <a:endParaRPr lang="en-US"/>
           </a:p>
@@ -700,7 +711,7 @@
           <a:p>
             <a:fld id="{BE24606C-7E03-4216-B317-9143B9B2995A}" type="datetimeFigureOut">
               <a:rPr lang="en-US" smtClean="0"/>
-              <a:t>11/17/2021</a:t>
+              <a:t>11/20/2021</a:t>
             </a:fld>
             <a:endParaRPr lang="en-US"/>
           </a:p>
@@ -898,7 +909,7 @@
           <a:p>
             <a:fld id="{BE24606C-7E03-4216-B317-9143B9B2995A}" type="datetimeFigureOut">
               <a:rPr lang="en-US" smtClean="0"/>
-              <a:t>11/17/2021</a:t>
+              <a:t>11/20/2021</a:t>
             </a:fld>
             <a:endParaRPr lang="en-US"/>
           </a:p>
@@ -1106,7 +1117,7 @@
           <a:p>
             <a:fld id="{BE24606C-7E03-4216-B317-9143B9B2995A}" type="datetimeFigureOut">
               <a:rPr lang="en-US" smtClean="0"/>
-              <a:t>11/17/2021</a:t>
+              <a:t>11/20/2021</a:t>
             </a:fld>
             <a:endParaRPr lang="en-US"/>
           </a:p>
@@ -1304,7 +1315,7 @@
           <a:p>
             <a:fld id="{BE24606C-7E03-4216-B317-9143B9B2995A}" type="datetimeFigureOut">
               <a:rPr lang="en-US" smtClean="0"/>
-              <a:t>11/17/2021</a:t>
+              <a:t>11/20/2021</a:t>
             </a:fld>
             <a:endParaRPr lang="en-US"/>
           </a:p>
@@ -1579,7 +1590,7 @@
           <a:p>
             <a:fld id="{BE24606C-7E03-4216-B317-9143B9B2995A}" type="datetimeFigureOut">
               <a:rPr lang="en-US" smtClean="0"/>
-              <a:t>11/17/2021</a:t>
+              <a:t>11/20/2021</a:t>
             </a:fld>
             <a:endParaRPr lang="en-US"/>
           </a:p>
@@ -1844,7 +1855,7 @@
           <a:p>
             <a:fld id="{BE24606C-7E03-4216-B317-9143B9B2995A}" type="datetimeFigureOut">
               <a:rPr lang="en-US" smtClean="0"/>
-              <a:t>11/17/2021</a:t>
+              <a:t>11/20/2021</a:t>
             </a:fld>
             <a:endParaRPr lang="en-US"/>
           </a:p>
@@ -2256,7 +2267,7 @@
           <a:p>
             <a:fld id="{BE24606C-7E03-4216-B317-9143B9B2995A}" type="datetimeFigureOut">
               <a:rPr lang="en-US" smtClean="0"/>
-              <a:t>11/17/2021</a:t>
+              <a:t>11/20/2021</a:t>
             </a:fld>
             <a:endParaRPr lang="en-US"/>
           </a:p>
@@ -2397,7 +2408,7 @@
           <a:p>
             <a:fld id="{BE24606C-7E03-4216-B317-9143B9B2995A}" type="datetimeFigureOut">
               <a:rPr lang="en-US" smtClean="0"/>
-              <a:t>11/17/2021</a:t>
+              <a:t>11/20/2021</a:t>
             </a:fld>
             <a:endParaRPr lang="en-US"/>
           </a:p>
@@ -2510,7 +2521,7 @@
           <a:p>
             <a:fld id="{BE24606C-7E03-4216-B317-9143B9B2995A}" type="datetimeFigureOut">
               <a:rPr lang="en-US" smtClean="0"/>
-              <a:t>11/17/2021</a:t>
+              <a:t>11/20/2021</a:t>
             </a:fld>
             <a:endParaRPr lang="en-US"/>
           </a:p>
@@ -2821,7 +2832,7 @@
           <a:p>
             <a:fld id="{BE24606C-7E03-4216-B317-9143B9B2995A}" type="datetimeFigureOut">
               <a:rPr lang="en-US" smtClean="0"/>
-              <a:t>11/17/2021</a:t>
+              <a:t>11/20/2021</a:t>
             </a:fld>
             <a:endParaRPr lang="en-US"/>
           </a:p>
@@ -3109,7 +3120,7 @@
           <a:p>
             <a:fld id="{BE24606C-7E03-4216-B317-9143B9B2995A}" type="datetimeFigureOut">
               <a:rPr lang="en-US" smtClean="0"/>
-              <a:t>11/17/2021</a:t>
+              <a:t>11/20/2021</a:t>
             </a:fld>
             <a:endParaRPr lang="en-US"/>
           </a:p>
@@ -3350,7 +3361,7 @@
           <a:p>
             <a:fld id="{BE24606C-7E03-4216-B317-9143B9B2995A}" type="datetimeFigureOut">
               <a:rPr lang="en-US" smtClean="0"/>
-              <a:t>11/17/2021</a:t>
+              <a:t>11/20/2021</a:t>
             </a:fld>
             <a:endParaRPr lang="en-US"/>
           </a:p>
@@ -3865,6 +3876,1424 @@
 </p:sld>
 </file>
 
+<file path=ppt/slides/slide10.xml><?xml version="1.0" encoding="utf-8"?>
+<p:sld xmlns:a="http://schemas.openxmlformats.org/drawingml/2006/main" xmlns:r="http://schemas.openxmlformats.org/officeDocument/2006/relationships" xmlns:p="http://schemas.openxmlformats.org/presentationml/2006/main">
+  <p:cSld>
+    <p:spTree>
+      <p:nvGrpSpPr>
+        <p:cNvPr id="1" name=""/>
+        <p:cNvGrpSpPr/>
+        <p:nvPr/>
+      </p:nvGrpSpPr>
+      <p:grpSpPr>
+        <a:xfrm>
+          <a:off x="0" y="0"/>
+          <a:ext cx="0" cy="0"/>
+          <a:chOff x="0" y="0"/>
+          <a:chExt cx="0" cy="0"/>
+        </a:xfrm>
+      </p:grpSpPr>
+      <p:sp>
+        <p:nvSpPr>
+          <p:cNvPr id="3" name="Content Placeholder 2">
+            <a:extLst>
+              <a:ext uri="{FF2B5EF4-FFF2-40B4-BE49-F238E27FC236}">
+                <a16:creationId xmlns:a16="http://schemas.microsoft.com/office/drawing/2014/main" id="{085D082B-14BC-450E-8C27-262C0658B979}"/>
+              </a:ext>
+            </a:extLst>
+          </p:cNvPr>
+          <p:cNvSpPr>
+            <a:spLocks noGrp="1"/>
+          </p:cNvSpPr>
+          <p:nvPr>
+            <p:ph idx="1"/>
+          </p:nvPr>
+        </p:nvSpPr>
+        <p:spPr/>
+        <p:txBody>
+          <a:bodyPr>
+            <a:normAutofit fontScale="92500" lnSpcReduction="10000"/>
+          </a:bodyPr>
+          <a:lstStyle/>
+          <a:p>
+            <a:r>
+              <a:rPr lang="en-US" dirty="0"/>
+              <a:t>I = 5</a:t>
+            </a:r>
+          </a:p>
+          <a:p>
+            <a:r>
+              <a:rPr lang="en-US" dirty="0"/>
+              <a:t>J = 10</a:t>
+            </a:r>
+          </a:p>
+          <a:p>
+            <a:r>
+              <a:rPr lang="en-US" b="1" dirty="0" err="1"/>
+              <a:t>nS</a:t>
+            </a:r>
+            <a:r>
+              <a:rPr lang="en-US" b="1" dirty="0"/>
+              <a:t> = 5000</a:t>
+            </a:r>
+          </a:p>
+          <a:p>
+            <a:r>
+              <a:rPr lang="en-US" dirty="0" err="1"/>
+              <a:t>SingleCut</a:t>
+            </a:r>
+            <a:r>
+              <a:rPr lang="en-US" dirty="0"/>
+              <a:t> 5-trial average: 54.21 s</a:t>
+            </a:r>
+          </a:p>
+          <a:p>
+            <a:r>
+              <a:rPr lang="en-US" dirty="0" err="1"/>
+              <a:t>ClusterSub</a:t>
+            </a:r>
+            <a:r>
+              <a:rPr lang="en-US" dirty="0"/>
+              <a:t> 5-trial average: 51.01 s (eps=5, </a:t>
+            </a:r>
+            <a:r>
+              <a:rPr lang="en-US" dirty="0" err="1"/>
+              <a:t>min_samples</a:t>
+            </a:r>
+            <a:r>
+              <a:rPr lang="en-US" dirty="0"/>
+              <a:t> = 3)</a:t>
+            </a:r>
+          </a:p>
+          <a:p>
+            <a:pPr lvl="1"/>
+            <a:r>
+              <a:rPr lang="en-US" dirty="0"/>
+              <a:t>Number of clusters = ~140 (a giant cluster and many individual subproblems)</a:t>
+            </a:r>
+          </a:p>
+          <a:p>
+            <a:r>
+              <a:rPr lang="en-US" dirty="0" err="1"/>
+              <a:t>Min_samples</a:t>
+            </a:r>
+            <a:r>
+              <a:rPr lang="en-US" dirty="0"/>
+              <a:t> = 3 seems to work well generally.</a:t>
+            </a:r>
+          </a:p>
+          <a:p>
+            <a:r>
+              <a:rPr lang="en-US" dirty="0"/>
+              <a:t>Epsilon needs to be adapted to problem parameters</a:t>
+            </a:r>
+          </a:p>
+          <a:p>
+            <a:pPr lvl="1"/>
+            <a:r>
+              <a:rPr lang="en-US" dirty="0">
+                <a:solidFill>
+                  <a:srgbClr val="FF0000"/>
+                </a:solidFill>
+              </a:rPr>
+              <a:t>Rule of thumb?: </a:t>
+            </a:r>
+            <a:r>
+              <a:rPr lang="en-US" dirty="0"/>
+              <a:t>Fix </a:t>
+            </a:r>
+            <a:r>
+              <a:rPr lang="en-US" dirty="0" err="1"/>
+              <a:t>min_samples</a:t>
+            </a:r>
+            <a:r>
+              <a:rPr lang="en-US" dirty="0"/>
+              <a:t> to 3 and find the first epsilon (starting from 2.0 and going to 0.1) which produces number of clusters &gt;= sqrt(</a:t>
+            </a:r>
+            <a:r>
+              <a:rPr lang="en-US" dirty="0" err="1"/>
+              <a:t>nS</a:t>
+            </a:r>
+            <a:r>
+              <a:rPr lang="en-US" dirty="0"/>
+              <a:t>). </a:t>
+            </a:r>
+            <a:r>
+              <a:rPr lang="en-US" b="1" dirty="0"/>
+              <a:t>Then take the “previous” epsilon.</a:t>
+            </a:r>
+          </a:p>
+          <a:p>
+            <a:endParaRPr lang="en-US" dirty="0"/>
+          </a:p>
+        </p:txBody>
+      </p:sp>
+    </p:spTree>
+    <p:extLst>
+      <p:ext uri="{BB962C8B-B14F-4D97-AF65-F5344CB8AC3E}">
+        <p14:creationId xmlns:p14="http://schemas.microsoft.com/office/powerpoint/2010/main" val="1728791867"/>
+      </p:ext>
+    </p:extLst>
+  </p:cSld>
+  <p:clrMapOvr>
+    <a:masterClrMapping/>
+  </p:clrMapOvr>
+</p:sld>
+</file>
+
+<file path=ppt/slides/slide11.xml><?xml version="1.0" encoding="utf-8"?>
+<p:sld xmlns:a="http://schemas.openxmlformats.org/drawingml/2006/main" xmlns:r="http://schemas.openxmlformats.org/officeDocument/2006/relationships" xmlns:p="http://schemas.openxmlformats.org/presentationml/2006/main">
+  <p:cSld>
+    <p:spTree>
+      <p:nvGrpSpPr>
+        <p:cNvPr id="1" name=""/>
+        <p:cNvGrpSpPr/>
+        <p:nvPr/>
+      </p:nvGrpSpPr>
+      <p:grpSpPr>
+        <a:xfrm>
+          <a:off x="0" y="0"/>
+          <a:ext cx="0" cy="0"/>
+          <a:chOff x="0" y="0"/>
+          <a:chExt cx="0" cy="0"/>
+        </a:xfrm>
+      </p:grpSpPr>
+      <p:sp>
+        <p:nvSpPr>
+          <p:cNvPr id="2" name="Title 1">
+            <a:extLst>
+              <a:ext uri="{FF2B5EF4-FFF2-40B4-BE49-F238E27FC236}">
+                <a16:creationId xmlns:a16="http://schemas.microsoft.com/office/drawing/2014/main" id="{68B89AB7-0F47-4088-B3EA-D018B3571428}"/>
+              </a:ext>
+            </a:extLst>
+          </p:cNvPr>
+          <p:cNvSpPr>
+            <a:spLocks noGrp="1"/>
+          </p:cNvSpPr>
+          <p:nvPr>
+            <p:ph type="title"/>
+          </p:nvPr>
+        </p:nvSpPr>
+        <p:spPr/>
+        <p:txBody>
+          <a:bodyPr/>
+          <a:lstStyle/>
+          <a:p>
+            <a:r>
+              <a:rPr lang="en-US" dirty="0"/>
+              <a:t>Testing Rule of Thumb</a:t>
+            </a:r>
+          </a:p>
+        </p:txBody>
+      </p:sp>
+      <p:sp>
+        <p:nvSpPr>
+          <p:cNvPr id="3" name="Content Placeholder 2">
+            <a:extLst>
+              <a:ext uri="{FF2B5EF4-FFF2-40B4-BE49-F238E27FC236}">
+                <a16:creationId xmlns:a16="http://schemas.microsoft.com/office/drawing/2014/main" id="{A3EED6FA-3916-4480-B6B0-A06752D8C9A6}"/>
+              </a:ext>
+            </a:extLst>
+          </p:cNvPr>
+          <p:cNvSpPr>
+            <a:spLocks noGrp="1"/>
+          </p:cNvSpPr>
+          <p:nvPr>
+            <p:ph idx="1"/>
+          </p:nvPr>
+        </p:nvSpPr>
+        <p:spPr/>
+        <p:txBody>
+          <a:bodyPr/>
+          <a:lstStyle/>
+          <a:p>
+            <a:pPr marL="0" indent="0">
+              <a:buNone/>
+            </a:pPr>
+            <a:r>
+              <a:rPr lang="en-US" dirty="0"/>
+              <a:t>Usually produces 1 &lt; # clusters &lt; sqrt(</a:t>
+            </a:r>
+            <a:r>
+              <a:rPr lang="en-US" dirty="0" err="1"/>
+              <a:t>nS</a:t>
+            </a:r>
+            <a:r>
+              <a:rPr lang="en-US" dirty="0"/>
+              <a:t>), but closer to 1.</a:t>
+            </a:r>
+          </a:p>
+          <a:p>
+            <a:r>
+              <a:rPr lang="en-US" dirty="0"/>
+              <a:t>I=5, J=10, </a:t>
+            </a:r>
+            <a:r>
+              <a:rPr lang="en-US" dirty="0" err="1"/>
+              <a:t>nS</a:t>
+            </a:r>
+            <a:r>
+              <a:rPr lang="en-US" dirty="0"/>
+              <a:t>=1000: </a:t>
+            </a:r>
+            <a:r>
+              <a:rPr lang="en-US" dirty="0" err="1"/>
+              <a:t>SingleCut</a:t>
+            </a:r>
+            <a:r>
+              <a:rPr lang="en-US" dirty="0"/>
+              <a:t> ~11s vs. </a:t>
+            </a:r>
+            <a:r>
+              <a:rPr lang="en-US" dirty="0" err="1"/>
+              <a:t>ClusterSub</a:t>
+            </a:r>
+            <a:r>
+              <a:rPr lang="en-US" dirty="0"/>
+              <a:t> ~9s</a:t>
+            </a:r>
+          </a:p>
+          <a:p>
+            <a:r>
+              <a:rPr lang="en-US" dirty="0"/>
+              <a:t>I=5, J=10, </a:t>
+            </a:r>
+            <a:r>
+              <a:rPr lang="en-US" dirty="0" err="1"/>
+              <a:t>nS</a:t>
+            </a:r>
+            <a:r>
+              <a:rPr lang="en-US" dirty="0"/>
+              <a:t>=5000: </a:t>
+            </a:r>
+            <a:r>
+              <a:rPr lang="en-US" dirty="0" err="1"/>
+              <a:t>SingleCut</a:t>
+            </a:r>
+            <a:r>
+              <a:rPr lang="en-US" dirty="0"/>
+              <a:t> ~54s vs. </a:t>
+            </a:r>
+            <a:r>
+              <a:rPr lang="en-US" dirty="0" err="1"/>
+              <a:t>ClusterSub</a:t>
+            </a:r>
+            <a:r>
+              <a:rPr lang="en-US" dirty="0"/>
+              <a:t> ~51s</a:t>
+            </a:r>
+          </a:p>
+          <a:p>
+            <a:r>
+              <a:rPr lang="en-US" dirty="0"/>
+              <a:t>I=10, J=15, </a:t>
+            </a:r>
+            <a:r>
+              <a:rPr lang="en-US" dirty="0" err="1"/>
+              <a:t>nS</a:t>
+            </a:r>
+            <a:r>
+              <a:rPr lang="en-US" dirty="0"/>
+              <a:t>=1000: </a:t>
+            </a:r>
+            <a:r>
+              <a:rPr lang="en-US" dirty="0" err="1"/>
+              <a:t>SingleCut</a:t>
+            </a:r>
+            <a:r>
+              <a:rPr lang="en-US" dirty="0"/>
+              <a:t> ~272s vs. </a:t>
+            </a:r>
+            <a:r>
+              <a:rPr lang="en-US" dirty="0">
+                <a:solidFill>
+                  <a:srgbClr val="FF0000"/>
+                </a:solidFill>
+              </a:rPr>
+              <a:t>~361s</a:t>
+            </a:r>
+          </a:p>
+          <a:p>
+            <a:pPr lvl="1"/>
+            <a:r>
+              <a:rPr lang="en-US" dirty="0"/>
+              <a:t>Two-trial average</a:t>
+            </a:r>
+          </a:p>
+        </p:txBody>
+      </p:sp>
+    </p:spTree>
+    <p:extLst>
+      <p:ext uri="{BB962C8B-B14F-4D97-AF65-F5344CB8AC3E}">
+        <p14:creationId xmlns:p14="http://schemas.microsoft.com/office/powerpoint/2010/main" val="2483689676"/>
+      </p:ext>
+    </p:extLst>
+  </p:cSld>
+  <p:clrMapOvr>
+    <a:masterClrMapping/>
+  </p:clrMapOvr>
+</p:sld>
+</file>
+
+<file path=ppt/slides/slide12.xml><?xml version="1.0" encoding="utf-8"?>
+<p:sld xmlns:a="http://schemas.openxmlformats.org/drawingml/2006/main" xmlns:r="http://schemas.openxmlformats.org/officeDocument/2006/relationships" xmlns:p="http://schemas.openxmlformats.org/presentationml/2006/main">
+  <p:cSld>
+    <p:spTree>
+      <p:nvGrpSpPr>
+        <p:cNvPr id="1" name=""/>
+        <p:cNvGrpSpPr/>
+        <p:nvPr/>
+      </p:nvGrpSpPr>
+      <p:grpSpPr>
+        <a:xfrm>
+          <a:off x="0" y="0"/>
+          <a:ext cx="0" cy="0"/>
+          <a:chOff x="0" y="0"/>
+          <a:chExt cx="0" cy="0"/>
+        </a:xfrm>
+      </p:grpSpPr>
+      <p:sp>
+        <p:nvSpPr>
+          <p:cNvPr id="2" name="Title 1">
+            <a:extLst>
+              <a:ext uri="{FF2B5EF4-FFF2-40B4-BE49-F238E27FC236}">
+                <a16:creationId xmlns:a16="http://schemas.microsoft.com/office/drawing/2014/main" id="{DA20A759-6422-4B63-A92F-C9ED3B36F62B}"/>
+              </a:ext>
+            </a:extLst>
+          </p:cNvPr>
+          <p:cNvSpPr>
+            <a:spLocks noGrp="1"/>
+          </p:cNvSpPr>
+          <p:nvPr>
+            <p:ph type="title"/>
+          </p:nvPr>
+        </p:nvSpPr>
+        <p:spPr/>
+        <p:txBody>
+          <a:bodyPr/>
+          <a:lstStyle/>
+          <a:p>
+            <a:r>
+              <a:rPr lang="en-CA" dirty="0"/>
+              <a:t>Preliminary Results (4)</a:t>
+            </a:r>
+            <a:endParaRPr lang="en-US" dirty="0"/>
+          </a:p>
+        </p:txBody>
+      </p:sp>
+      <p:sp>
+        <p:nvSpPr>
+          <p:cNvPr id="3" name="Content Placeholder 2">
+            <a:extLst>
+              <a:ext uri="{FF2B5EF4-FFF2-40B4-BE49-F238E27FC236}">
+                <a16:creationId xmlns:a16="http://schemas.microsoft.com/office/drawing/2014/main" id="{306E457A-F421-40DF-9EDD-F0ED46853E69}"/>
+              </a:ext>
+            </a:extLst>
+          </p:cNvPr>
+          <p:cNvSpPr>
+            <a:spLocks noGrp="1"/>
+          </p:cNvSpPr>
+          <p:nvPr>
+            <p:ph idx="1"/>
+          </p:nvPr>
+        </p:nvSpPr>
+        <p:spPr/>
+        <p:txBody>
+          <a:bodyPr/>
+          <a:lstStyle/>
+          <a:p>
+            <a:r>
+              <a:rPr lang="en-CA" dirty="0"/>
+              <a:t>Aggregate cuts based on dual solutions and objective values</a:t>
+            </a:r>
+          </a:p>
+          <a:p>
+            <a:r>
+              <a:rPr lang="en-CA" dirty="0"/>
+              <a:t>Include if aggregated cut is violated</a:t>
+            </a:r>
+          </a:p>
+          <a:p>
+            <a:pPr marL="0" indent="0">
+              <a:buNone/>
+            </a:pPr>
+            <a:endParaRPr lang="en-US" dirty="0"/>
+          </a:p>
+        </p:txBody>
+      </p:sp>
+    </p:spTree>
+    <p:extLst>
+      <p:ext uri="{BB962C8B-B14F-4D97-AF65-F5344CB8AC3E}">
+        <p14:creationId xmlns:p14="http://schemas.microsoft.com/office/powerpoint/2010/main" val="3139535858"/>
+      </p:ext>
+    </p:extLst>
+  </p:cSld>
+  <p:clrMapOvr>
+    <a:masterClrMapping/>
+  </p:clrMapOvr>
+</p:sld>
+</file>
+
+<file path=ppt/slides/slide13.xml><?xml version="1.0" encoding="utf-8"?>
+<p:sld xmlns:a="http://schemas.openxmlformats.org/drawingml/2006/main" xmlns:r="http://schemas.openxmlformats.org/officeDocument/2006/relationships" xmlns:p="http://schemas.openxmlformats.org/presentationml/2006/main">
+  <p:cSld>
+    <p:spTree>
+      <p:nvGrpSpPr>
+        <p:cNvPr id="1" name=""/>
+        <p:cNvGrpSpPr/>
+        <p:nvPr/>
+      </p:nvGrpSpPr>
+      <p:grpSpPr>
+        <a:xfrm>
+          <a:off x="0" y="0"/>
+          <a:ext cx="0" cy="0"/>
+          <a:chOff x="0" y="0"/>
+          <a:chExt cx="0" cy="0"/>
+        </a:xfrm>
+      </p:grpSpPr>
+      <p:sp>
+        <p:nvSpPr>
+          <p:cNvPr id="2" name="Title 1">
+            <a:extLst>
+              <a:ext uri="{FF2B5EF4-FFF2-40B4-BE49-F238E27FC236}">
+                <a16:creationId xmlns:a16="http://schemas.microsoft.com/office/drawing/2014/main" id="{EF330F27-CFB1-4A81-B681-A7C61DD3FAA3}"/>
+              </a:ext>
+            </a:extLst>
+          </p:cNvPr>
+          <p:cNvSpPr>
+            <a:spLocks noGrp="1"/>
+          </p:cNvSpPr>
+          <p:nvPr>
+            <p:ph type="title"/>
+          </p:nvPr>
+        </p:nvSpPr>
+        <p:spPr/>
+        <p:txBody>
+          <a:bodyPr/>
+          <a:lstStyle/>
+          <a:p>
+            <a:r>
+              <a:rPr lang="en-CA" dirty="0"/>
+              <a:t>Computational Times</a:t>
+            </a:r>
+            <a:endParaRPr lang="en-US" dirty="0"/>
+          </a:p>
+        </p:txBody>
+      </p:sp>
+      <p:sp>
+        <p:nvSpPr>
+          <p:cNvPr id="3" name="Content Placeholder 2">
+            <a:extLst>
+              <a:ext uri="{FF2B5EF4-FFF2-40B4-BE49-F238E27FC236}">
+                <a16:creationId xmlns:a16="http://schemas.microsoft.com/office/drawing/2014/main" id="{19C94931-E6CF-4E05-A46D-C855A7F985C8}"/>
+              </a:ext>
+            </a:extLst>
+          </p:cNvPr>
+          <p:cNvSpPr>
+            <a:spLocks noGrp="1"/>
+          </p:cNvSpPr>
+          <p:nvPr>
+            <p:ph idx="1"/>
+          </p:nvPr>
+        </p:nvSpPr>
+        <p:spPr/>
+        <p:txBody>
+          <a:bodyPr>
+            <a:normAutofit/>
+          </a:bodyPr>
+          <a:lstStyle/>
+          <a:p>
+            <a:r>
+              <a:rPr lang="en-CA" sz="2000" dirty="0" err="1"/>
+              <a:t>MultiCut</a:t>
+            </a:r>
+            <a:r>
+              <a:rPr lang="en-CA" sz="2000" dirty="0"/>
+              <a:t>: ~85 s | </a:t>
+            </a:r>
+            <a:r>
+              <a:rPr lang="en-CA" sz="2000" dirty="0" err="1"/>
+              <a:t>SingleCut</a:t>
+            </a:r>
+            <a:r>
+              <a:rPr lang="en-CA" sz="2000" dirty="0"/>
+              <a:t>: </a:t>
+            </a:r>
+            <a:r>
+              <a:rPr lang="en-CA" sz="2000" b="1" dirty="0"/>
+              <a:t>11.37 s </a:t>
+            </a:r>
+            <a:r>
+              <a:rPr lang="en-CA" sz="2000" dirty="0"/>
+              <a:t>(avg. from 15 trials)</a:t>
+            </a:r>
+          </a:p>
+        </p:txBody>
+      </p:sp>
+      <p:pic>
+        <p:nvPicPr>
+          <p:cNvPr id="6" name="Picture 5">
+            <a:extLst>
+              <a:ext uri="{FF2B5EF4-FFF2-40B4-BE49-F238E27FC236}">
+                <a16:creationId xmlns:a16="http://schemas.microsoft.com/office/drawing/2014/main" id="{F6022D33-37D3-4F03-9740-9A2AAD85965D}"/>
+              </a:ext>
+            </a:extLst>
+          </p:cNvPr>
+          <p:cNvPicPr>
+            <a:picLocks noChangeAspect="1"/>
+          </p:cNvPicPr>
+          <p:nvPr/>
+        </p:nvPicPr>
+        <p:blipFill>
+          <a:blip r:embed="rId2"/>
+          <a:stretch>
+            <a:fillRect/>
+          </a:stretch>
+        </p:blipFill>
+        <p:spPr>
+          <a:xfrm>
+            <a:off x="1275174" y="2574346"/>
+            <a:ext cx="9641651" cy="2291568"/>
+          </a:xfrm>
+          <a:prstGeom prst="rect">
+            <a:avLst/>
+          </a:prstGeom>
+        </p:spPr>
+      </p:pic>
+      <p:sp>
+        <p:nvSpPr>
+          <p:cNvPr id="7" name="Rectangle: Rounded Corners 6">
+            <a:extLst>
+              <a:ext uri="{FF2B5EF4-FFF2-40B4-BE49-F238E27FC236}">
+                <a16:creationId xmlns:a16="http://schemas.microsoft.com/office/drawing/2014/main" id="{4CD33F79-C0F2-46B3-8659-2A517D8F2CA8}"/>
+              </a:ext>
+            </a:extLst>
+          </p:cNvPr>
+          <p:cNvSpPr/>
+          <p:nvPr/>
+        </p:nvSpPr>
+        <p:spPr>
+          <a:xfrm>
+            <a:off x="1077686" y="3224893"/>
+            <a:ext cx="9944100" cy="204107"/>
+          </a:xfrm>
+          <a:prstGeom prst="roundRect">
+            <a:avLst/>
+          </a:prstGeom>
+          <a:noFill/>
+          <a:ln>
+            <a:solidFill>
+              <a:srgbClr val="FF0000"/>
+            </a:solidFill>
+          </a:ln>
+        </p:spPr>
+        <p:style>
+          <a:lnRef idx="2">
+            <a:schemeClr val="accent1">
+              <a:shade val="50000"/>
+            </a:schemeClr>
+          </a:lnRef>
+          <a:fillRef idx="1">
+            <a:schemeClr val="accent1"/>
+          </a:fillRef>
+          <a:effectRef idx="0">
+            <a:schemeClr val="accent1"/>
+          </a:effectRef>
+          <a:fontRef idx="minor">
+            <a:schemeClr val="lt1"/>
+          </a:fontRef>
+        </p:style>
+        <p:txBody>
+          <a:bodyPr rtlCol="0" anchor="ctr"/>
+          <a:lstStyle/>
+          <a:p>
+            <a:pPr algn="ctr"/>
+            <a:endParaRPr lang="en-US"/>
+          </a:p>
+        </p:txBody>
+      </p:sp>
+    </p:spTree>
+    <p:extLst>
+      <p:ext uri="{BB962C8B-B14F-4D97-AF65-F5344CB8AC3E}">
+        <p14:creationId xmlns:p14="http://schemas.microsoft.com/office/powerpoint/2010/main" val="2650617361"/>
+      </p:ext>
+    </p:extLst>
+  </p:cSld>
+  <p:clrMapOvr>
+    <a:masterClrMapping/>
+  </p:clrMapOvr>
+</p:sld>
+</file>
+
+<file path=ppt/slides/slide14.xml><?xml version="1.0" encoding="utf-8"?>
+<p:sld xmlns:a="http://schemas.openxmlformats.org/drawingml/2006/main" xmlns:r="http://schemas.openxmlformats.org/officeDocument/2006/relationships" xmlns:p="http://schemas.openxmlformats.org/presentationml/2006/main">
+  <p:cSld>
+    <p:spTree>
+      <p:nvGrpSpPr>
+        <p:cNvPr id="1" name=""/>
+        <p:cNvGrpSpPr/>
+        <p:nvPr/>
+      </p:nvGrpSpPr>
+      <p:grpSpPr>
+        <a:xfrm>
+          <a:off x="0" y="0"/>
+          <a:ext cx="0" cy="0"/>
+          <a:chOff x="0" y="0"/>
+          <a:chExt cx="0" cy="0"/>
+        </a:xfrm>
+      </p:grpSpPr>
+      <p:sp>
+        <p:nvSpPr>
+          <p:cNvPr id="2" name="Title 1">
+            <a:extLst>
+              <a:ext uri="{FF2B5EF4-FFF2-40B4-BE49-F238E27FC236}">
+                <a16:creationId xmlns:a16="http://schemas.microsoft.com/office/drawing/2014/main" id="{68B89AB7-0F47-4088-B3EA-D018B3571428}"/>
+              </a:ext>
+            </a:extLst>
+          </p:cNvPr>
+          <p:cNvSpPr>
+            <a:spLocks noGrp="1"/>
+          </p:cNvSpPr>
+          <p:nvPr>
+            <p:ph type="title"/>
+          </p:nvPr>
+        </p:nvSpPr>
+        <p:spPr/>
+        <p:txBody>
+          <a:bodyPr/>
+          <a:lstStyle/>
+          <a:p>
+            <a:r>
+              <a:rPr lang="en-CA" dirty="0"/>
+              <a:t>Computational Times</a:t>
+            </a:r>
+            <a:endParaRPr lang="en-US" dirty="0"/>
+          </a:p>
+        </p:txBody>
+      </p:sp>
+      <p:sp>
+        <p:nvSpPr>
+          <p:cNvPr id="3" name="Content Placeholder 2">
+            <a:extLst>
+              <a:ext uri="{FF2B5EF4-FFF2-40B4-BE49-F238E27FC236}">
+                <a16:creationId xmlns:a16="http://schemas.microsoft.com/office/drawing/2014/main" id="{A3EED6FA-3916-4480-B6B0-A06752D8C9A6}"/>
+              </a:ext>
+            </a:extLst>
+          </p:cNvPr>
+          <p:cNvSpPr>
+            <a:spLocks noGrp="1"/>
+          </p:cNvSpPr>
+          <p:nvPr>
+            <p:ph idx="1"/>
+          </p:nvPr>
+        </p:nvSpPr>
+        <p:spPr/>
+        <p:txBody>
+          <a:bodyPr>
+            <a:normAutofit/>
+          </a:bodyPr>
+          <a:lstStyle/>
+          <a:p>
+            <a:r>
+              <a:rPr lang="en-US" sz="2400" dirty="0"/>
+              <a:t>I=5, J=10, </a:t>
+            </a:r>
+            <a:r>
+              <a:rPr lang="en-US" sz="2400" dirty="0" err="1"/>
+              <a:t>nS</a:t>
+            </a:r>
+            <a:r>
+              <a:rPr lang="en-US" sz="2400" dirty="0"/>
+              <a:t>=5000: </a:t>
+            </a:r>
+            <a:r>
+              <a:rPr lang="en-US" sz="2400" dirty="0" err="1"/>
+              <a:t>SingleCut</a:t>
+            </a:r>
+            <a:r>
+              <a:rPr lang="en-US" sz="2400" dirty="0"/>
+              <a:t> ~54s vs. </a:t>
+            </a:r>
+            <a:r>
+              <a:rPr lang="en-US" sz="2400" dirty="0" err="1"/>
+              <a:t>ClusterCut</a:t>
+            </a:r>
+            <a:r>
+              <a:rPr lang="en-US" sz="2400" dirty="0"/>
+              <a:t> ~57s</a:t>
+            </a:r>
+          </a:p>
+          <a:p>
+            <a:endParaRPr lang="en-US" sz="2400" dirty="0"/>
+          </a:p>
+          <a:p>
+            <a:endParaRPr lang="en-US" sz="2400" dirty="0"/>
+          </a:p>
+          <a:p>
+            <a:endParaRPr lang="en-US" sz="2400" dirty="0"/>
+          </a:p>
+          <a:p>
+            <a:endParaRPr lang="en-US" sz="2400" dirty="0"/>
+          </a:p>
+          <a:p>
+            <a:r>
+              <a:rPr lang="en-US" sz="2400" dirty="0"/>
+              <a:t>I=10, J=15, </a:t>
+            </a:r>
+            <a:r>
+              <a:rPr lang="en-US" sz="2400" dirty="0" err="1"/>
+              <a:t>nS</a:t>
+            </a:r>
+            <a:r>
+              <a:rPr lang="en-US" sz="2400" dirty="0"/>
+              <a:t>=1000: </a:t>
+            </a:r>
+            <a:r>
+              <a:rPr lang="en-US" sz="2400" dirty="0" err="1"/>
+              <a:t>SingleCut</a:t>
+            </a:r>
+            <a:r>
+              <a:rPr lang="en-US" sz="2400" dirty="0"/>
+              <a:t> ~272s vs. </a:t>
+            </a:r>
+            <a:r>
+              <a:rPr lang="en-US" sz="2400" dirty="0">
+                <a:solidFill>
+                  <a:srgbClr val="FF0000"/>
+                </a:solidFill>
+              </a:rPr>
+              <a:t>~382s</a:t>
+            </a:r>
+          </a:p>
+        </p:txBody>
+      </p:sp>
+      <p:pic>
+        <p:nvPicPr>
+          <p:cNvPr id="5" name="Picture 4">
+            <a:extLst>
+              <a:ext uri="{FF2B5EF4-FFF2-40B4-BE49-F238E27FC236}">
+                <a16:creationId xmlns:a16="http://schemas.microsoft.com/office/drawing/2014/main" id="{D16D8890-AE2B-4180-A9A8-F7B34B34F9CB}"/>
+              </a:ext>
+            </a:extLst>
+          </p:cNvPr>
+          <p:cNvPicPr>
+            <a:picLocks noChangeAspect="1"/>
+          </p:cNvPicPr>
+          <p:nvPr/>
+        </p:nvPicPr>
+        <p:blipFill>
+          <a:blip r:embed="rId2"/>
+          <a:stretch>
+            <a:fillRect/>
+          </a:stretch>
+        </p:blipFill>
+        <p:spPr>
+          <a:xfrm>
+            <a:off x="2404547" y="2248449"/>
+            <a:ext cx="7382905" cy="1752845"/>
+          </a:xfrm>
+          <a:prstGeom prst="rect">
+            <a:avLst/>
+          </a:prstGeom>
+        </p:spPr>
+      </p:pic>
+      <p:sp>
+        <p:nvSpPr>
+          <p:cNvPr id="6" name="Rectangle: Rounded Corners 5">
+            <a:extLst>
+              <a:ext uri="{FF2B5EF4-FFF2-40B4-BE49-F238E27FC236}">
+                <a16:creationId xmlns:a16="http://schemas.microsoft.com/office/drawing/2014/main" id="{FE1729E7-145B-4D43-8396-B05CE57CF573}"/>
+              </a:ext>
+            </a:extLst>
+          </p:cNvPr>
+          <p:cNvSpPr/>
+          <p:nvPr/>
+        </p:nvSpPr>
+        <p:spPr>
+          <a:xfrm>
+            <a:off x="2277836" y="2743200"/>
+            <a:ext cx="7617278" cy="204107"/>
+          </a:xfrm>
+          <a:prstGeom prst="roundRect">
+            <a:avLst/>
+          </a:prstGeom>
+          <a:noFill/>
+          <a:ln>
+            <a:solidFill>
+              <a:srgbClr val="FF0000"/>
+            </a:solidFill>
+          </a:ln>
+        </p:spPr>
+        <p:style>
+          <a:lnRef idx="2">
+            <a:schemeClr val="accent1">
+              <a:shade val="50000"/>
+            </a:schemeClr>
+          </a:lnRef>
+          <a:fillRef idx="1">
+            <a:schemeClr val="accent1"/>
+          </a:fillRef>
+          <a:effectRef idx="0">
+            <a:schemeClr val="accent1"/>
+          </a:effectRef>
+          <a:fontRef idx="minor">
+            <a:schemeClr val="lt1"/>
+          </a:fontRef>
+        </p:style>
+        <p:txBody>
+          <a:bodyPr rtlCol="0" anchor="ctr"/>
+          <a:lstStyle/>
+          <a:p>
+            <a:pPr algn="ctr"/>
+            <a:endParaRPr lang="en-US"/>
+          </a:p>
+        </p:txBody>
+      </p:sp>
+    </p:spTree>
+    <p:extLst>
+      <p:ext uri="{BB962C8B-B14F-4D97-AF65-F5344CB8AC3E}">
+        <p14:creationId xmlns:p14="http://schemas.microsoft.com/office/powerpoint/2010/main" val="3795073547"/>
+      </p:ext>
+    </p:extLst>
+  </p:cSld>
+  <p:clrMapOvr>
+    <a:masterClrMapping/>
+  </p:clrMapOvr>
+</p:sld>
+</file>
+
+<file path=ppt/slides/slide15.xml><?xml version="1.0" encoding="utf-8"?>
+<p:sld xmlns:a="http://schemas.openxmlformats.org/drawingml/2006/main" xmlns:r="http://schemas.openxmlformats.org/officeDocument/2006/relationships" xmlns:p="http://schemas.openxmlformats.org/presentationml/2006/main">
+  <p:cSld>
+    <p:spTree>
+      <p:nvGrpSpPr>
+        <p:cNvPr id="1" name=""/>
+        <p:cNvGrpSpPr/>
+        <p:nvPr/>
+      </p:nvGrpSpPr>
+      <p:grpSpPr>
+        <a:xfrm>
+          <a:off x="0" y="0"/>
+          <a:ext cx="0" cy="0"/>
+          <a:chOff x="0" y="0"/>
+          <a:chExt cx="0" cy="0"/>
+        </a:xfrm>
+      </p:grpSpPr>
+      <p:sp>
+        <p:nvSpPr>
+          <p:cNvPr id="2" name="Title 1">
+            <a:extLst>
+              <a:ext uri="{FF2B5EF4-FFF2-40B4-BE49-F238E27FC236}">
+                <a16:creationId xmlns:a16="http://schemas.microsoft.com/office/drawing/2014/main" id="{DA20A759-6422-4B63-A92F-C9ED3B36F62B}"/>
+              </a:ext>
+            </a:extLst>
+          </p:cNvPr>
+          <p:cNvSpPr>
+            <a:spLocks noGrp="1"/>
+          </p:cNvSpPr>
+          <p:nvPr>
+            <p:ph type="title"/>
+          </p:nvPr>
+        </p:nvSpPr>
+        <p:spPr/>
+        <p:txBody>
+          <a:bodyPr/>
+          <a:lstStyle/>
+          <a:p>
+            <a:r>
+              <a:rPr lang="en-CA" dirty="0"/>
+              <a:t>Preliminary Results (5)</a:t>
+            </a:r>
+            <a:endParaRPr lang="en-US" dirty="0"/>
+          </a:p>
+        </p:txBody>
+      </p:sp>
+      <p:sp>
+        <p:nvSpPr>
+          <p:cNvPr id="3" name="Content Placeholder 2">
+            <a:extLst>
+              <a:ext uri="{FF2B5EF4-FFF2-40B4-BE49-F238E27FC236}">
+                <a16:creationId xmlns:a16="http://schemas.microsoft.com/office/drawing/2014/main" id="{306E457A-F421-40DF-9EDD-F0ED46853E69}"/>
+              </a:ext>
+            </a:extLst>
+          </p:cNvPr>
+          <p:cNvSpPr>
+            <a:spLocks noGrp="1"/>
+          </p:cNvSpPr>
+          <p:nvPr>
+            <p:ph idx="1"/>
+          </p:nvPr>
+        </p:nvSpPr>
+        <p:spPr/>
+        <p:txBody>
+          <a:bodyPr/>
+          <a:lstStyle/>
+          <a:p>
+            <a:r>
+              <a:rPr lang="en-CA" dirty="0"/>
+              <a:t>Aggregate cuts based on objective values only</a:t>
+            </a:r>
+          </a:p>
+          <a:p>
+            <a:r>
+              <a:rPr lang="en-CA" dirty="0"/>
+              <a:t>Include if aggregated cut is violated</a:t>
+            </a:r>
+          </a:p>
+          <a:p>
+            <a:pPr marL="0" indent="0">
+              <a:buNone/>
+            </a:pPr>
+            <a:endParaRPr lang="en-US" dirty="0"/>
+          </a:p>
+        </p:txBody>
+      </p:sp>
+    </p:spTree>
+    <p:extLst>
+      <p:ext uri="{BB962C8B-B14F-4D97-AF65-F5344CB8AC3E}">
+        <p14:creationId xmlns:p14="http://schemas.microsoft.com/office/powerpoint/2010/main" val="1059251219"/>
+      </p:ext>
+    </p:extLst>
+  </p:cSld>
+  <p:clrMapOvr>
+    <a:masterClrMapping/>
+  </p:clrMapOvr>
+</p:sld>
+</file>
+
+<file path=ppt/slides/slide16.xml><?xml version="1.0" encoding="utf-8"?>
+<p:sld xmlns:a="http://schemas.openxmlformats.org/drawingml/2006/main" xmlns:r="http://schemas.openxmlformats.org/officeDocument/2006/relationships" xmlns:p="http://schemas.openxmlformats.org/presentationml/2006/main">
+  <p:cSld>
+    <p:spTree>
+      <p:nvGrpSpPr>
+        <p:cNvPr id="1" name=""/>
+        <p:cNvGrpSpPr/>
+        <p:nvPr/>
+      </p:nvGrpSpPr>
+      <p:grpSpPr>
+        <a:xfrm>
+          <a:off x="0" y="0"/>
+          <a:ext cx="0" cy="0"/>
+          <a:chOff x="0" y="0"/>
+          <a:chExt cx="0" cy="0"/>
+        </a:xfrm>
+      </p:grpSpPr>
+      <p:sp>
+        <p:nvSpPr>
+          <p:cNvPr id="2" name="Title 1">
+            <a:extLst>
+              <a:ext uri="{FF2B5EF4-FFF2-40B4-BE49-F238E27FC236}">
+                <a16:creationId xmlns:a16="http://schemas.microsoft.com/office/drawing/2014/main" id="{9504AD55-796C-45AE-9FBB-890758F360D5}"/>
+              </a:ext>
+            </a:extLst>
+          </p:cNvPr>
+          <p:cNvSpPr>
+            <a:spLocks noGrp="1"/>
+          </p:cNvSpPr>
+          <p:nvPr>
+            <p:ph type="title"/>
+          </p:nvPr>
+        </p:nvSpPr>
+        <p:spPr/>
+        <p:txBody>
+          <a:bodyPr/>
+          <a:lstStyle/>
+          <a:p>
+            <a:r>
+              <a:rPr lang="en-CA" dirty="0"/>
+              <a:t>Computational Times</a:t>
+            </a:r>
+            <a:endParaRPr lang="en-US" dirty="0"/>
+          </a:p>
+        </p:txBody>
+      </p:sp>
+      <p:sp>
+        <p:nvSpPr>
+          <p:cNvPr id="3" name="Content Placeholder 2">
+            <a:extLst>
+              <a:ext uri="{FF2B5EF4-FFF2-40B4-BE49-F238E27FC236}">
+                <a16:creationId xmlns:a16="http://schemas.microsoft.com/office/drawing/2014/main" id="{06CBA648-A930-4FEA-91D1-774F4BDAD2A9}"/>
+              </a:ext>
+            </a:extLst>
+          </p:cNvPr>
+          <p:cNvSpPr>
+            <a:spLocks noGrp="1"/>
+          </p:cNvSpPr>
+          <p:nvPr>
+            <p:ph idx="1"/>
+          </p:nvPr>
+        </p:nvSpPr>
+        <p:spPr/>
+        <p:txBody>
+          <a:bodyPr/>
+          <a:lstStyle/>
+          <a:p>
+            <a:r>
+              <a:rPr lang="en-CA" dirty="0"/>
+              <a:t>I=5, J=10, S=1000</a:t>
+            </a:r>
+            <a:endParaRPr lang="en-US" dirty="0"/>
+          </a:p>
+        </p:txBody>
+      </p:sp>
+      <p:pic>
+        <p:nvPicPr>
+          <p:cNvPr id="5" name="Picture 4">
+            <a:extLst>
+              <a:ext uri="{FF2B5EF4-FFF2-40B4-BE49-F238E27FC236}">
+                <a16:creationId xmlns:a16="http://schemas.microsoft.com/office/drawing/2014/main" id="{48F1DEBA-16F8-4E8A-99CD-0E88A5BC3AD9}"/>
+              </a:ext>
+            </a:extLst>
+          </p:cNvPr>
+          <p:cNvPicPr>
+            <a:picLocks noChangeAspect="1"/>
+          </p:cNvPicPr>
+          <p:nvPr/>
+        </p:nvPicPr>
+        <p:blipFill>
+          <a:blip r:embed="rId2"/>
+          <a:stretch>
+            <a:fillRect/>
+          </a:stretch>
+        </p:blipFill>
+        <p:spPr>
+          <a:xfrm>
+            <a:off x="2261652" y="2371481"/>
+            <a:ext cx="7668695" cy="3486637"/>
+          </a:xfrm>
+          <a:prstGeom prst="rect">
+            <a:avLst/>
+          </a:prstGeom>
+        </p:spPr>
+      </p:pic>
+      <p:sp>
+        <p:nvSpPr>
+          <p:cNvPr id="6" name="Rectangle: Rounded Corners 5">
+            <a:extLst>
+              <a:ext uri="{FF2B5EF4-FFF2-40B4-BE49-F238E27FC236}">
+                <a16:creationId xmlns:a16="http://schemas.microsoft.com/office/drawing/2014/main" id="{F4DA1FC4-7A5D-4173-B982-533F1BE816F3}"/>
+              </a:ext>
+            </a:extLst>
+          </p:cNvPr>
+          <p:cNvSpPr/>
+          <p:nvPr/>
+        </p:nvSpPr>
+        <p:spPr>
+          <a:xfrm>
+            <a:off x="2106386" y="4098471"/>
+            <a:ext cx="7927521" cy="669472"/>
+          </a:xfrm>
+          <a:prstGeom prst="roundRect">
+            <a:avLst/>
+          </a:prstGeom>
+          <a:noFill/>
+          <a:ln>
+            <a:solidFill>
+              <a:srgbClr val="FF0000"/>
+            </a:solidFill>
+          </a:ln>
+        </p:spPr>
+        <p:style>
+          <a:lnRef idx="2">
+            <a:schemeClr val="accent1">
+              <a:shade val="50000"/>
+            </a:schemeClr>
+          </a:lnRef>
+          <a:fillRef idx="1">
+            <a:schemeClr val="accent1"/>
+          </a:fillRef>
+          <a:effectRef idx="0">
+            <a:schemeClr val="accent1"/>
+          </a:effectRef>
+          <a:fontRef idx="minor">
+            <a:schemeClr val="lt1"/>
+          </a:fontRef>
+        </p:style>
+        <p:txBody>
+          <a:bodyPr rtlCol="0" anchor="ctr"/>
+          <a:lstStyle/>
+          <a:p>
+            <a:pPr algn="ctr"/>
+            <a:endParaRPr lang="en-US"/>
+          </a:p>
+        </p:txBody>
+      </p:sp>
+    </p:spTree>
+    <p:extLst>
+      <p:ext uri="{BB962C8B-B14F-4D97-AF65-F5344CB8AC3E}">
+        <p14:creationId xmlns:p14="http://schemas.microsoft.com/office/powerpoint/2010/main" val="81258616"/>
+      </p:ext>
+    </p:extLst>
+  </p:cSld>
+  <p:clrMapOvr>
+    <a:masterClrMapping/>
+  </p:clrMapOvr>
+</p:sld>
+</file>
+
+<file path=ppt/slides/slide17.xml><?xml version="1.0" encoding="utf-8"?>
+<p:sld xmlns:a="http://schemas.openxmlformats.org/drawingml/2006/main" xmlns:r="http://schemas.openxmlformats.org/officeDocument/2006/relationships" xmlns:p="http://schemas.openxmlformats.org/presentationml/2006/main">
+  <p:cSld>
+    <p:spTree>
+      <p:nvGrpSpPr>
+        <p:cNvPr id="1" name=""/>
+        <p:cNvGrpSpPr/>
+        <p:nvPr/>
+      </p:nvGrpSpPr>
+      <p:grpSpPr>
+        <a:xfrm>
+          <a:off x="0" y="0"/>
+          <a:ext cx="0" cy="0"/>
+          <a:chOff x="0" y="0"/>
+          <a:chExt cx="0" cy="0"/>
+        </a:xfrm>
+      </p:grpSpPr>
+      <p:pic>
+        <p:nvPicPr>
+          <p:cNvPr id="7" name="Picture 6">
+            <a:extLst>
+              <a:ext uri="{FF2B5EF4-FFF2-40B4-BE49-F238E27FC236}">
+                <a16:creationId xmlns:a16="http://schemas.microsoft.com/office/drawing/2014/main" id="{094EA3BB-69C7-4EC0-9441-2B4CDA99A133}"/>
+              </a:ext>
+            </a:extLst>
+          </p:cNvPr>
+          <p:cNvPicPr>
+            <a:picLocks noChangeAspect="1"/>
+          </p:cNvPicPr>
+          <p:nvPr/>
+        </p:nvPicPr>
+        <p:blipFill>
+          <a:blip r:embed="rId2"/>
+          <a:stretch>
+            <a:fillRect/>
+          </a:stretch>
+        </p:blipFill>
+        <p:spPr>
+          <a:xfrm>
+            <a:off x="2299757" y="2286555"/>
+            <a:ext cx="7592485" cy="1714739"/>
+          </a:xfrm>
+          <a:prstGeom prst="rect">
+            <a:avLst/>
+          </a:prstGeom>
+        </p:spPr>
+      </p:pic>
+      <p:sp>
+        <p:nvSpPr>
+          <p:cNvPr id="2" name="Title 1">
+            <a:extLst>
+              <a:ext uri="{FF2B5EF4-FFF2-40B4-BE49-F238E27FC236}">
+                <a16:creationId xmlns:a16="http://schemas.microsoft.com/office/drawing/2014/main" id="{68B89AB7-0F47-4088-B3EA-D018B3571428}"/>
+              </a:ext>
+            </a:extLst>
+          </p:cNvPr>
+          <p:cNvSpPr>
+            <a:spLocks noGrp="1"/>
+          </p:cNvSpPr>
+          <p:nvPr>
+            <p:ph type="title"/>
+          </p:nvPr>
+        </p:nvSpPr>
+        <p:spPr/>
+        <p:txBody>
+          <a:bodyPr/>
+          <a:lstStyle/>
+          <a:p>
+            <a:r>
+              <a:rPr lang="en-CA" dirty="0"/>
+              <a:t>Computational Times</a:t>
+            </a:r>
+            <a:endParaRPr lang="en-US" dirty="0"/>
+          </a:p>
+        </p:txBody>
+      </p:sp>
+      <p:sp>
+        <p:nvSpPr>
+          <p:cNvPr id="3" name="Content Placeholder 2">
+            <a:extLst>
+              <a:ext uri="{FF2B5EF4-FFF2-40B4-BE49-F238E27FC236}">
+                <a16:creationId xmlns:a16="http://schemas.microsoft.com/office/drawing/2014/main" id="{A3EED6FA-3916-4480-B6B0-A06752D8C9A6}"/>
+              </a:ext>
+            </a:extLst>
+          </p:cNvPr>
+          <p:cNvSpPr>
+            <a:spLocks noGrp="1"/>
+          </p:cNvSpPr>
+          <p:nvPr>
+            <p:ph idx="1"/>
+          </p:nvPr>
+        </p:nvSpPr>
+        <p:spPr>
+          <a:xfrm>
+            <a:off x="838200" y="1825625"/>
+            <a:ext cx="10515600" cy="4730296"/>
+          </a:xfrm>
+        </p:spPr>
+        <p:txBody>
+          <a:bodyPr>
+            <a:normAutofit/>
+          </a:bodyPr>
+          <a:lstStyle/>
+          <a:p>
+            <a:r>
+              <a:rPr lang="en-US" sz="2400" dirty="0"/>
+              <a:t>I=5, J=10, </a:t>
+            </a:r>
+            <a:r>
+              <a:rPr lang="en-US" sz="2400" dirty="0" err="1"/>
+              <a:t>nS</a:t>
+            </a:r>
+            <a:r>
+              <a:rPr lang="en-US" sz="2400" dirty="0"/>
+              <a:t>=5000: </a:t>
+            </a:r>
+            <a:r>
+              <a:rPr lang="en-US" sz="2400" dirty="0" err="1"/>
+              <a:t>SingleCut</a:t>
+            </a:r>
+            <a:r>
+              <a:rPr lang="en-US" sz="2400" dirty="0"/>
+              <a:t> ~54s vs. </a:t>
+            </a:r>
+            <a:r>
+              <a:rPr lang="en-US" sz="2400" dirty="0" err="1"/>
+              <a:t>ClusterCut</a:t>
+            </a:r>
+            <a:r>
+              <a:rPr lang="en-US" sz="2400" dirty="0"/>
+              <a:t> ~52s</a:t>
+            </a:r>
+          </a:p>
+          <a:p>
+            <a:endParaRPr lang="en-US" sz="2400" dirty="0"/>
+          </a:p>
+          <a:p>
+            <a:endParaRPr lang="en-US" sz="2400" dirty="0"/>
+          </a:p>
+          <a:p>
+            <a:endParaRPr lang="en-US" sz="2400" dirty="0"/>
+          </a:p>
+          <a:p>
+            <a:endParaRPr lang="en-US" sz="2400" dirty="0"/>
+          </a:p>
+          <a:p>
+            <a:r>
+              <a:rPr lang="en-US" sz="2400" dirty="0"/>
+              <a:t>I=10, J=15, </a:t>
+            </a:r>
+            <a:r>
+              <a:rPr lang="en-US" sz="2400" dirty="0" err="1"/>
+              <a:t>nS</a:t>
+            </a:r>
+            <a:r>
+              <a:rPr lang="en-US" sz="2400" dirty="0"/>
+              <a:t>=1000: </a:t>
+            </a:r>
+            <a:r>
+              <a:rPr lang="en-US" sz="2400" dirty="0" err="1"/>
+              <a:t>SingleCut</a:t>
+            </a:r>
+            <a:r>
+              <a:rPr lang="en-US" sz="2400" dirty="0"/>
+              <a:t> ~272s vs. </a:t>
+            </a:r>
+            <a:r>
+              <a:rPr lang="en-US" sz="2400" dirty="0" err="1"/>
+              <a:t>ClusterCut</a:t>
+            </a:r>
+            <a:r>
+              <a:rPr lang="en-US" sz="2400" dirty="0"/>
+              <a:t> </a:t>
+            </a:r>
+            <a:r>
+              <a:rPr lang="en-US" sz="2400" dirty="0">
+                <a:solidFill>
+                  <a:srgbClr val="00B050"/>
+                </a:solidFill>
+              </a:rPr>
+              <a:t>~262s</a:t>
+            </a:r>
+          </a:p>
+          <a:p>
+            <a:pPr lvl="1"/>
+            <a:r>
+              <a:rPr lang="en-US" sz="2000" dirty="0"/>
+              <a:t>Averaged from three trials</a:t>
+            </a:r>
+          </a:p>
+          <a:p>
+            <a:r>
+              <a:rPr lang="en-US" sz="2400" dirty="0"/>
+              <a:t>I=10, J=15, </a:t>
+            </a:r>
+            <a:r>
+              <a:rPr lang="en-US" sz="2400" dirty="0" err="1"/>
+              <a:t>nS</a:t>
+            </a:r>
+            <a:r>
+              <a:rPr lang="en-US" sz="2400" dirty="0"/>
+              <a:t>=2500: </a:t>
+            </a:r>
+            <a:r>
+              <a:rPr lang="en-US" sz="2400" dirty="0" err="1"/>
+              <a:t>SIngleCut</a:t>
+            </a:r>
+            <a:r>
+              <a:rPr lang="en-US" sz="2400" dirty="0"/>
+              <a:t> ~617s vs. </a:t>
+            </a:r>
+            <a:r>
+              <a:rPr lang="en-US" sz="2400" dirty="0" err="1"/>
+              <a:t>ClusterCut</a:t>
+            </a:r>
+            <a:r>
+              <a:rPr lang="en-US" sz="2400" dirty="0"/>
+              <a:t> ~674s</a:t>
+            </a:r>
+          </a:p>
+          <a:p>
+            <a:r>
+              <a:rPr lang="en-US" sz="2400" dirty="0"/>
+              <a:t>Conclusions:</a:t>
+            </a:r>
+          </a:p>
+          <a:p>
+            <a:pPr lvl="1"/>
+            <a:r>
+              <a:rPr lang="en-US" sz="2000" dirty="0"/>
+              <a:t>Adaptive clustering on objective values only seems to work best</a:t>
+            </a:r>
+          </a:p>
+          <a:p>
+            <a:pPr lvl="1"/>
+            <a:r>
+              <a:rPr lang="en-US" sz="2000" dirty="0"/>
+              <a:t>eps=0.03 and </a:t>
+            </a:r>
+            <a:r>
+              <a:rPr lang="en-US" sz="2000" dirty="0" err="1"/>
+              <a:t>min_samples</a:t>
+            </a:r>
+            <a:r>
+              <a:rPr lang="en-US" sz="2000" dirty="0"/>
+              <a:t> = 3 seem to work ok in general.</a:t>
+            </a:r>
+          </a:p>
+        </p:txBody>
+      </p:sp>
+    </p:spTree>
+    <p:extLst>
+      <p:ext uri="{BB962C8B-B14F-4D97-AF65-F5344CB8AC3E}">
+        <p14:creationId xmlns:p14="http://schemas.microsoft.com/office/powerpoint/2010/main" val="3315722691"/>
+      </p:ext>
+    </p:extLst>
+  </p:cSld>
+  <p:clrMapOvr>
+    <a:masterClrMapping/>
+  </p:clrMapOvr>
+</p:sld>
+</file>
+
 <file path=ppt/slides/slide2.xml><?xml version="1.0" encoding="utf-8"?>
 <p:sld xmlns:a="http://schemas.openxmlformats.org/drawingml/2006/main" xmlns:r="http://schemas.openxmlformats.org/officeDocument/2006/relationships" xmlns:p="http://schemas.openxmlformats.org/presentationml/2006/main">
   <p:cSld>
@@ -6658,6 +8087,1284 @@
     <p:extLst>
       <p:ext uri="{BB962C8B-B14F-4D97-AF65-F5344CB8AC3E}">
         <p14:creationId xmlns:p14="http://schemas.microsoft.com/office/powerpoint/2010/main" val="129587482"/>
+      </p:ext>
+    </p:extLst>
+  </p:cSld>
+  <p:clrMapOvr>
+    <a:masterClrMapping/>
+  </p:clrMapOvr>
+</p:sld>
+</file>
+
+<file path=ppt/slides/slide7.xml><?xml version="1.0" encoding="utf-8"?>
+<p:sld xmlns:a="http://schemas.openxmlformats.org/drawingml/2006/main" xmlns:r="http://schemas.openxmlformats.org/officeDocument/2006/relationships" xmlns:p="http://schemas.openxmlformats.org/presentationml/2006/main">
+  <p:cSld>
+    <p:spTree>
+      <p:nvGrpSpPr>
+        <p:cNvPr id="1" name=""/>
+        <p:cNvGrpSpPr/>
+        <p:nvPr/>
+      </p:nvGrpSpPr>
+      <p:grpSpPr>
+        <a:xfrm>
+          <a:off x="0" y="0"/>
+          <a:ext cx="0" cy="0"/>
+          <a:chOff x="0" y="0"/>
+          <a:chExt cx="0" cy="0"/>
+        </a:xfrm>
+      </p:grpSpPr>
+      <p:sp>
+        <p:nvSpPr>
+          <p:cNvPr id="2" name="Title 1">
+            <a:extLst>
+              <a:ext uri="{FF2B5EF4-FFF2-40B4-BE49-F238E27FC236}">
+                <a16:creationId xmlns:a16="http://schemas.microsoft.com/office/drawing/2014/main" id="{F5810C30-F5EA-4179-B607-86F854B44E12}"/>
+              </a:ext>
+            </a:extLst>
+          </p:cNvPr>
+          <p:cNvSpPr>
+            <a:spLocks noGrp="1"/>
+          </p:cNvSpPr>
+          <p:nvPr>
+            <p:ph type="title"/>
+          </p:nvPr>
+        </p:nvSpPr>
+        <p:spPr/>
+        <p:txBody>
+          <a:bodyPr/>
+          <a:lstStyle/>
+          <a:p>
+            <a:r>
+              <a:rPr lang="en-US" dirty="0"/>
+              <a:t>Preliminary Results (3)</a:t>
+            </a:r>
+          </a:p>
+        </p:txBody>
+      </p:sp>
+      <p:sp>
+        <p:nvSpPr>
+          <p:cNvPr id="3" name="Content Placeholder 2">
+            <a:extLst>
+              <a:ext uri="{FF2B5EF4-FFF2-40B4-BE49-F238E27FC236}">
+                <a16:creationId xmlns:a16="http://schemas.microsoft.com/office/drawing/2014/main" id="{17518044-E9C4-4F34-890F-065EC9815D7E}"/>
+              </a:ext>
+            </a:extLst>
+          </p:cNvPr>
+          <p:cNvSpPr>
+            <a:spLocks noGrp="1"/>
+          </p:cNvSpPr>
+          <p:nvPr>
+            <p:ph idx="1"/>
+          </p:nvPr>
+        </p:nvSpPr>
+        <p:spPr/>
+        <p:txBody>
+          <a:bodyPr/>
+          <a:lstStyle/>
+          <a:p>
+            <a:r>
+              <a:rPr lang="en-US" dirty="0"/>
+              <a:t>Aggregate cuts from each cluster instead. </a:t>
+            </a:r>
+          </a:p>
+          <a:p>
+            <a:pPr lvl="1"/>
+            <a:r>
+              <a:rPr lang="en-US" dirty="0"/>
+              <a:t>Aggregating prevents loss of information compared to selecting just one cut.</a:t>
+            </a:r>
+          </a:p>
+          <a:p>
+            <a:r>
+              <a:rPr lang="en-US" dirty="0"/>
+              <a:t>Include if the aggregated cut is violated.</a:t>
+            </a:r>
+          </a:p>
+        </p:txBody>
+      </p:sp>
+    </p:spTree>
+    <p:extLst>
+      <p:ext uri="{BB962C8B-B14F-4D97-AF65-F5344CB8AC3E}">
+        <p14:creationId xmlns:p14="http://schemas.microsoft.com/office/powerpoint/2010/main" val="4056097859"/>
+      </p:ext>
+    </p:extLst>
+  </p:cSld>
+  <p:clrMapOvr>
+    <a:masterClrMapping/>
+  </p:clrMapOvr>
+</p:sld>
+</file>
+
+<file path=ppt/slides/slide8.xml><?xml version="1.0" encoding="utf-8"?>
+<p:sld xmlns:a="http://schemas.openxmlformats.org/drawingml/2006/main" xmlns:r="http://schemas.openxmlformats.org/officeDocument/2006/relationships" xmlns:p="http://schemas.openxmlformats.org/presentationml/2006/main">
+  <p:cSld>
+    <p:spTree>
+      <p:nvGrpSpPr>
+        <p:cNvPr id="1" name=""/>
+        <p:cNvGrpSpPr/>
+        <p:nvPr/>
+      </p:nvGrpSpPr>
+      <p:grpSpPr>
+        <a:xfrm>
+          <a:off x="0" y="0"/>
+          <a:ext cx="0" cy="0"/>
+          <a:chOff x="0" y="0"/>
+          <a:chExt cx="0" cy="0"/>
+        </a:xfrm>
+      </p:grpSpPr>
+      <p:sp>
+        <p:nvSpPr>
+          <p:cNvPr id="2" name="Title 1">
+            <a:extLst>
+              <a:ext uri="{FF2B5EF4-FFF2-40B4-BE49-F238E27FC236}">
+                <a16:creationId xmlns:a16="http://schemas.microsoft.com/office/drawing/2014/main" id="{EF330F27-CFB1-4A81-B681-A7C61DD3FAA3}"/>
+              </a:ext>
+            </a:extLst>
+          </p:cNvPr>
+          <p:cNvSpPr>
+            <a:spLocks noGrp="1"/>
+          </p:cNvSpPr>
+          <p:nvPr>
+            <p:ph type="title"/>
+          </p:nvPr>
+        </p:nvSpPr>
+        <p:spPr/>
+        <p:txBody>
+          <a:bodyPr/>
+          <a:lstStyle/>
+          <a:p>
+            <a:r>
+              <a:rPr lang="en-CA" dirty="0"/>
+              <a:t>Computational Times</a:t>
+            </a:r>
+            <a:endParaRPr lang="en-US" dirty="0"/>
+          </a:p>
+        </p:txBody>
+      </p:sp>
+      <p:sp>
+        <p:nvSpPr>
+          <p:cNvPr id="3" name="Content Placeholder 2">
+            <a:extLst>
+              <a:ext uri="{FF2B5EF4-FFF2-40B4-BE49-F238E27FC236}">
+                <a16:creationId xmlns:a16="http://schemas.microsoft.com/office/drawing/2014/main" id="{19C94931-E6CF-4E05-A46D-C855A7F985C8}"/>
+              </a:ext>
+            </a:extLst>
+          </p:cNvPr>
+          <p:cNvSpPr>
+            <a:spLocks noGrp="1"/>
+          </p:cNvSpPr>
+          <p:nvPr>
+            <p:ph idx="1"/>
+          </p:nvPr>
+        </p:nvSpPr>
+        <p:spPr/>
+        <p:txBody>
+          <a:bodyPr>
+            <a:normAutofit/>
+          </a:bodyPr>
+          <a:lstStyle/>
+          <a:p>
+            <a:r>
+              <a:rPr lang="en-CA" sz="2000" dirty="0" err="1"/>
+              <a:t>MultiCut</a:t>
+            </a:r>
+            <a:r>
+              <a:rPr lang="en-CA" sz="2000" dirty="0"/>
+              <a:t>: ~85 s | </a:t>
+            </a:r>
+            <a:r>
+              <a:rPr lang="en-CA" sz="2000" dirty="0" err="1"/>
+              <a:t>SingleCut</a:t>
+            </a:r>
+            <a:r>
+              <a:rPr lang="en-CA" sz="2000" dirty="0"/>
+              <a:t>: </a:t>
+            </a:r>
+            <a:r>
+              <a:rPr lang="en-CA" sz="2000" b="1" dirty="0"/>
+              <a:t>11.37 s </a:t>
+            </a:r>
+            <a:r>
+              <a:rPr lang="en-CA" sz="2000" dirty="0"/>
+              <a:t>(avg. from 15 trials)</a:t>
+            </a:r>
+          </a:p>
+          <a:p>
+            <a:r>
+              <a:rPr lang="en-CA" sz="2000" dirty="0"/>
+              <a:t>With larger clusters, including more cuts improves time dramatically.</a:t>
+            </a:r>
+          </a:p>
+          <a:p>
+            <a:endParaRPr lang="en-US" sz="2000" dirty="0"/>
+          </a:p>
+        </p:txBody>
+      </p:sp>
+      <p:graphicFrame>
+        <p:nvGraphicFramePr>
+          <p:cNvPr id="4" name="Table 4">
+            <a:extLst>
+              <a:ext uri="{FF2B5EF4-FFF2-40B4-BE49-F238E27FC236}">
+                <a16:creationId xmlns:a16="http://schemas.microsoft.com/office/drawing/2014/main" id="{CA250F5A-E2D7-4F59-9E69-00BD1D856DF4}"/>
+              </a:ext>
+            </a:extLst>
+          </p:cNvPr>
+          <p:cNvGraphicFramePr>
+            <a:graphicFrameLocks noGrp="1"/>
+          </p:cNvGraphicFramePr>
+          <p:nvPr>
+            <p:extLst>
+              <p:ext uri="{D42A27DB-BD31-4B8C-83A1-F6EECF244321}">
+                <p14:modId xmlns:p14="http://schemas.microsoft.com/office/powerpoint/2010/main" val="1975980906"/>
+              </p:ext>
+            </p:extLst>
+          </p:nvPr>
+        </p:nvGraphicFramePr>
+        <p:xfrm>
+          <a:off x="2031999" y="2888774"/>
+          <a:ext cx="8128002" cy="3327400"/>
+        </p:xfrm>
+        <a:graphic>
+          <a:graphicData uri="http://schemas.openxmlformats.org/drawingml/2006/table">
+            <a:tbl>
+              <a:tblPr firstRow="1" bandRow="1">
+                <a:tableStyleId>{5940675A-B579-460E-94D1-54222C63F5DA}</a:tableStyleId>
+              </a:tblPr>
+              <a:tblGrid>
+                <a:gridCol w="1354667">
+                  <a:extLst>
+                    <a:ext uri="{9D8B030D-6E8A-4147-A177-3AD203B41FA5}">
+                      <a16:colId xmlns:a16="http://schemas.microsoft.com/office/drawing/2014/main" val="744537011"/>
+                    </a:ext>
+                  </a:extLst>
+                </a:gridCol>
+                <a:gridCol w="1354667">
+                  <a:extLst>
+                    <a:ext uri="{9D8B030D-6E8A-4147-A177-3AD203B41FA5}">
+                      <a16:colId xmlns:a16="http://schemas.microsoft.com/office/drawing/2014/main" val="2029095467"/>
+                    </a:ext>
+                  </a:extLst>
+                </a:gridCol>
+                <a:gridCol w="1354667">
+                  <a:extLst>
+                    <a:ext uri="{9D8B030D-6E8A-4147-A177-3AD203B41FA5}">
+                      <a16:colId xmlns:a16="http://schemas.microsoft.com/office/drawing/2014/main" val="1250535078"/>
+                    </a:ext>
+                  </a:extLst>
+                </a:gridCol>
+                <a:gridCol w="1354667">
+                  <a:extLst>
+                    <a:ext uri="{9D8B030D-6E8A-4147-A177-3AD203B41FA5}">
+                      <a16:colId xmlns:a16="http://schemas.microsoft.com/office/drawing/2014/main" val="1393674268"/>
+                    </a:ext>
+                  </a:extLst>
+                </a:gridCol>
+                <a:gridCol w="1354667">
+                  <a:extLst>
+                    <a:ext uri="{9D8B030D-6E8A-4147-A177-3AD203B41FA5}">
+                      <a16:colId xmlns:a16="http://schemas.microsoft.com/office/drawing/2014/main" val="2299454125"/>
+                    </a:ext>
+                  </a:extLst>
+                </a:gridCol>
+                <a:gridCol w="1354667">
+                  <a:extLst>
+                    <a:ext uri="{9D8B030D-6E8A-4147-A177-3AD203B41FA5}">
+                      <a16:colId xmlns:a16="http://schemas.microsoft.com/office/drawing/2014/main" val="1430482639"/>
+                    </a:ext>
+                  </a:extLst>
+                </a:gridCol>
+              </a:tblGrid>
+              <a:tr h="185420">
+                <a:tc>
+                  <a:txBody>
+                    <a:bodyPr/>
+                    <a:lstStyle/>
+                    <a:p>
+                      <a:r>
+                        <a:rPr lang="en-CA" i="1" dirty="0">
+                          <a:solidFill>
+                            <a:srgbClr val="FF0000"/>
+                          </a:solidFill>
+                        </a:rPr>
+                        <a:t>*in seconds</a:t>
+                      </a:r>
+                      <a:endParaRPr lang="en-US" i="1" dirty="0">
+                        <a:solidFill>
+                          <a:srgbClr val="FF0000"/>
+                        </a:solidFill>
+                      </a:endParaRPr>
+                    </a:p>
+                  </a:txBody>
+                  <a:tcPr/>
+                </a:tc>
+                <a:tc gridSpan="5">
+                  <a:txBody>
+                    <a:bodyPr/>
+                    <a:lstStyle/>
+                    <a:p>
+                      <a:pPr algn="ctr"/>
+                      <a:r>
+                        <a:rPr lang="en-CA" i="1" dirty="0" err="1"/>
+                        <a:t>Min_samples</a:t>
+                      </a:r>
+                      <a:endParaRPr lang="en-US" i="1" dirty="0"/>
+                    </a:p>
+                  </a:txBody>
+                  <a:tcPr/>
+                </a:tc>
+                <a:tc hMerge="1">
+                  <a:txBody>
+                    <a:bodyPr/>
+                    <a:lstStyle/>
+                    <a:p>
+                      <a:endParaRPr lang="en-US" dirty="0"/>
+                    </a:p>
+                  </a:txBody>
+                  <a:tcPr/>
+                </a:tc>
+                <a:tc hMerge="1">
+                  <a:txBody>
+                    <a:bodyPr/>
+                    <a:lstStyle/>
+                    <a:p>
+                      <a:endParaRPr lang="en-US" dirty="0"/>
+                    </a:p>
+                  </a:txBody>
+                  <a:tcPr/>
+                </a:tc>
+                <a:tc hMerge="1">
+                  <a:txBody>
+                    <a:bodyPr/>
+                    <a:lstStyle/>
+                    <a:p>
+                      <a:endParaRPr lang="en-US" dirty="0"/>
+                    </a:p>
+                  </a:txBody>
+                  <a:tcPr/>
+                </a:tc>
+                <a:tc hMerge="1">
+                  <a:txBody>
+                    <a:bodyPr/>
+                    <a:lstStyle/>
+                    <a:p>
+                      <a:endParaRPr lang="en-US" dirty="0"/>
+                    </a:p>
+                  </a:txBody>
+                  <a:tcPr/>
+                </a:tc>
+                <a:extLst>
+                  <a:ext uri="{0D108BD9-81ED-4DB2-BD59-A6C34878D82A}">
+                    <a16:rowId xmlns:a16="http://schemas.microsoft.com/office/drawing/2014/main" val="143820220"/>
+                  </a:ext>
+                </a:extLst>
+              </a:tr>
+              <a:tr h="185420">
+                <a:tc>
+                  <a:txBody>
+                    <a:bodyPr/>
+                    <a:lstStyle/>
+                    <a:p>
+                      <a:pPr algn="ctr"/>
+                      <a:r>
+                        <a:rPr lang="en-CA" i="1" dirty="0"/>
+                        <a:t>Epsilon</a:t>
+                      </a:r>
+                      <a:endParaRPr lang="en-US" i="1" dirty="0"/>
+                    </a:p>
+                  </a:txBody>
+                  <a:tcPr/>
+                </a:tc>
+                <a:tc>
+                  <a:txBody>
+                    <a:bodyPr/>
+                    <a:lstStyle/>
+                    <a:p>
+                      <a:pPr algn="ctr"/>
+                      <a:r>
+                        <a:rPr lang="en-CA" dirty="0"/>
+                        <a:t>1</a:t>
+                      </a:r>
+                      <a:endParaRPr lang="en-US" dirty="0"/>
+                    </a:p>
+                  </a:txBody>
+                  <a:tcPr/>
+                </a:tc>
+                <a:tc>
+                  <a:txBody>
+                    <a:bodyPr/>
+                    <a:lstStyle/>
+                    <a:p>
+                      <a:pPr algn="ctr"/>
+                      <a:r>
+                        <a:rPr lang="en-CA" dirty="0"/>
+                        <a:t>2</a:t>
+                      </a:r>
+                      <a:endParaRPr lang="en-US" dirty="0"/>
+                    </a:p>
+                  </a:txBody>
+                  <a:tcPr/>
+                </a:tc>
+                <a:tc>
+                  <a:txBody>
+                    <a:bodyPr/>
+                    <a:lstStyle/>
+                    <a:p>
+                      <a:pPr algn="ctr"/>
+                      <a:r>
+                        <a:rPr lang="en-CA" dirty="0"/>
+                        <a:t>3</a:t>
+                      </a:r>
+                      <a:endParaRPr lang="en-US" dirty="0"/>
+                    </a:p>
+                  </a:txBody>
+                  <a:tcPr/>
+                </a:tc>
+                <a:tc>
+                  <a:txBody>
+                    <a:bodyPr/>
+                    <a:lstStyle/>
+                    <a:p>
+                      <a:pPr algn="ctr"/>
+                      <a:r>
+                        <a:rPr lang="en-CA" dirty="0"/>
+                        <a:t>4</a:t>
+                      </a:r>
+                      <a:endParaRPr lang="en-US" dirty="0"/>
+                    </a:p>
+                  </a:txBody>
+                  <a:tcPr/>
+                </a:tc>
+                <a:tc>
+                  <a:txBody>
+                    <a:bodyPr/>
+                    <a:lstStyle/>
+                    <a:p>
+                      <a:pPr algn="ctr"/>
+                      <a:r>
+                        <a:rPr lang="en-CA" dirty="0"/>
+                        <a:t>5</a:t>
+                      </a:r>
+                      <a:endParaRPr lang="en-US" dirty="0"/>
+                    </a:p>
+                  </a:txBody>
+                  <a:tcPr/>
+                </a:tc>
+                <a:extLst>
+                  <a:ext uri="{0D108BD9-81ED-4DB2-BD59-A6C34878D82A}">
+                    <a16:rowId xmlns:a16="http://schemas.microsoft.com/office/drawing/2014/main" val="4038012084"/>
+                  </a:ext>
+                </a:extLst>
+              </a:tr>
+              <a:tr h="370840">
+                <a:tc>
+                  <a:txBody>
+                    <a:bodyPr/>
+                    <a:lstStyle/>
+                    <a:p>
+                      <a:pPr algn="ctr"/>
+                      <a:r>
+                        <a:rPr lang="en-CA" dirty="0"/>
+                        <a:t>0.1</a:t>
+                      </a:r>
+                      <a:endParaRPr lang="en-US" dirty="0"/>
+                    </a:p>
+                  </a:txBody>
+                  <a:tcPr/>
+                </a:tc>
+                <a:tc>
+                  <a:txBody>
+                    <a:bodyPr/>
+                    <a:lstStyle/>
+                    <a:p>
+                      <a:pPr algn="ctr"/>
+                      <a:r>
+                        <a:rPr lang="en-US" dirty="0"/>
+                        <a:t>76.42</a:t>
+                      </a:r>
+                    </a:p>
+                  </a:txBody>
+                  <a:tcPr/>
+                </a:tc>
+                <a:tc>
+                  <a:txBody>
+                    <a:bodyPr/>
+                    <a:lstStyle/>
+                    <a:p>
+                      <a:pPr algn="ctr"/>
+                      <a:r>
+                        <a:rPr lang="en-US" dirty="0"/>
+                        <a:t>82.44</a:t>
+                      </a:r>
+                    </a:p>
+                  </a:txBody>
+                  <a:tcPr/>
+                </a:tc>
+                <a:tc>
+                  <a:txBody>
+                    <a:bodyPr/>
+                    <a:lstStyle/>
+                    <a:p>
+                      <a:pPr algn="ctr"/>
+                      <a:r>
+                        <a:rPr lang="en-US" dirty="0"/>
+                        <a:t>80.85</a:t>
+                      </a:r>
+                    </a:p>
+                  </a:txBody>
+                  <a:tcPr/>
+                </a:tc>
+                <a:tc>
+                  <a:txBody>
+                    <a:bodyPr/>
+                    <a:lstStyle/>
+                    <a:p>
+                      <a:pPr algn="ctr"/>
+                      <a:r>
+                        <a:rPr lang="en-US" dirty="0"/>
+                        <a:t>81.05</a:t>
+                      </a:r>
+                    </a:p>
+                  </a:txBody>
+                  <a:tcPr/>
+                </a:tc>
+                <a:tc>
+                  <a:txBody>
+                    <a:bodyPr/>
+                    <a:lstStyle/>
+                    <a:p>
+                      <a:pPr algn="ctr"/>
+                      <a:r>
+                        <a:rPr lang="en-US" dirty="0"/>
+                        <a:t>88.08</a:t>
+                      </a:r>
+                    </a:p>
+                  </a:txBody>
+                  <a:tcPr/>
+                </a:tc>
+                <a:extLst>
+                  <a:ext uri="{0D108BD9-81ED-4DB2-BD59-A6C34878D82A}">
+                    <a16:rowId xmlns:a16="http://schemas.microsoft.com/office/drawing/2014/main" val="1419800199"/>
+                  </a:ext>
+                </a:extLst>
+              </a:tr>
+              <a:tr h="370840">
+                <a:tc>
+                  <a:txBody>
+                    <a:bodyPr/>
+                    <a:lstStyle/>
+                    <a:p>
+                      <a:pPr algn="ctr"/>
+                      <a:r>
+                        <a:rPr lang="en-CA" dirty="0"/>
+                        <a:t>0.2</a:t>
+                      </a:r>
+                      <a:endParaRPr lang="en-US" dirty="0"/>
+                    </a:p>
+                  </a:txBody>
+                  <a:tcPr/>
+                </a:tc>
+                <a:tc>
+                  <a:txBody>
+                    <a:bodyPr/>
+                    <a:lstStyle/>
+                    <a:p>
+                      <a:pPr algn="ctr"/>
+                      <a:r>
+                        <a:rPr lang="en-US" dirty="0"/>
+                        <a:t>94.49</a:t>
+                      </a:r>
+                    </a:p>
+                  </a:txBody>
+                  <a:tcPr/>
+                </a:tc>
+                <a:tc>
+                  <a:txBody>
+                    <a:bodyPr/>
+                    <a:lstStyle/>
+                    <a:p>
+                      <a:pPr algn="ctr"/>
+                      <a:r>
+                        <a:rPr lang="en-US" dirty="0"/>
+                        <a:t>65.08</a:t>
+                      </a:r>
+                    </a:p>
+                  </a:txBody>
+                  <a:tcPr/>
+                </a:tc>
+                <a:tc>
+                  <a:txBody>
+                    <a:bodyPr/>
+                    <a:lstStyle/>
+                    <a:p>
+                      <a:pPr algn="ctr"/>
+                      <a:r>
+                        <a:rPr lang="en-US" dirty="0"/>
+                        <a:t>82.78</a:t>
+                      </a:r>
+                    </a:p>
+                  </a:txBody>
+                  <a:tcPr/>
+                </a:tc>
+                <a:tc>
+                  <a:txBody>
+                    <a:bodyPr/>
+                    <a:lstStyle/>
+                    <a:p>
+                      <a:pPr algn="ctr"/>
+                      <a:r>
+                        <a:rPr lang="en-US" dirty="0"/>
+                        <a:t>82.54</a:t>
+                      </a:r>
+                    </a:p>
+                  </a:txBody>
+                  <a:tcPr/>
+                </a:tc>
+                <a:tc>
+                  <a:txBody>
+                    <a:bodyPr/>
+                    <a:lstStyle/>
+                    <a:p>
+                      <a:pPr algn="ctr"/>
+                      <a:r>
+                        <a:rPr lang="en-US" dirty="0"/>
+                        <a:t>83.08</a:t>
+                      </a:r>
+                    </a:p>
+                  </a:txBody>
+                  <a:tcPr/>
+                </a:tc>
+                <a:extLst>
+                  <a:ext uri="{0D108BD9-81ED-4DB2-BD59-A6C34878D82A}">
+                    <a16:rowId xmlns:a16="http://schemas.microsoft.com/office/drawing/2014/main" val="3673588678"/>
+                  </a:ext>
+                </a:extLst>
+              </a:tr>
+              <a:tr h="370840">
+                <a:tc>
+                  <a:txBody>
+                    <a:bodyPr/>
+                    <a:lstStyle/>
+                    <a:p>
+                      <a:pPr algn="ctr"/>
+                      <a:r>
+                        <a:rPr lang="en-CA" dirty="0"/>
+                        <a:t>0.3</a:t>
+                      </a:r>
+                      <a:endParaRPr lang="en-US" dirty="0"/>
+                    </a:p>
+                  </a:txBody>
+                  <a:tcPr/>
+                </a:tc>
+                <a:tc>
+                  <a:txBody>
+                    <a:bodyPr/>
+                    <a:lstStyle/>
+                    <a:p>
+                      <a:pPr algn="ctr"/>
+                      <a:r>
+                        <a:rPr lang="en-US" b="0" dirty="0">
+                          <a:solidFill>
+                            <a:schemeClr val="tx1"/>
+                          </a:solidFill>
+                        </a:rPr>
+                        <a:t>45.88</a:t>
+                      </a:r>
+                    </a:p>
+                  </a:txBody>
+                  <a:tcPr/>
+                </a:tc>
+                <a:tc>
+                  <a:txBody>
+                    <a:bodyPr/>
+                    <a:lstStyle/>
+                    <a:p>
+                      <a:pPr algn="ctr"/>
+                      <a:r>
+                        <a:rPr lang="en-US" b="0" dirty="0">
+                          <a:solidFill>
+                            <a:schemeClr val="tx1"/>
+                          </a:solidFill>
+                        </a:rPr>
+                        <a:t>32.45</a:t>
+                      </a:r>
+                    </a:p>
+                  </a:txBody>
+                  <a:tcPr/>
+                </a:tc>
+                <a:tc>
+                  <a:txBody>
+                    <a:bodyPr/>
+                    <a:lstStyle/>
+                    <a:p>
+                      <a:pPr algn="ctr"/>
+                      <a:r>
+                        <a:rPr lang="en-US" b="0" dirty="0">
+                          <a:solidFill>
+                            <a:schemeClr val="tx1"/>
+                          </a:solidFill>
+                        </a:rPr>
+                        <a:t>39.06</a:t>
+                      </a:r>
+                    </a:p>
+                  </a:txBody>
+                  <a:tcPr/>
+                </a:tc>
+                <a:tc>
+                  <a:txBody>
+                    <a:bodyPr/>
+                    <a:lstStyle/>
+                    <a:p>
+                      <a:pPr algn="ctr"/>
+                      <a:r>
+                        <a:rPr lang="en-US" b="0" dirty="0">
+                          <a:solidFill>
+                            <a:schemeClr val="tx1"/>
+                          </a:solidFill>
+                        </a:rPr>
+                        <a:t>42.87</a:t>
+                      </a:r>
+                    </a:p>
+                  </a:txBody>
+                  <a:tcPr/>
+                </a:tc>
+                <a:tc>
+                  <a:txBody>
+                    <a:bodyPr/>
+                    <a:lstStyle/>
+                    <a:p>
+                      <a:pPr algn="ctr"/>
+                      <a:r>
+                        <a:rPr lang="en-US" b="0" dirty="0">
+                          <a:solidFill>
+                            <a:schemeClr val="tx1"/>
+                          </a:solidFill>
+                        </a:rPr>
+                        <a:t>42.00</a:t>
+                      </a:r>
+                    </a:p>
+                  </a:txBody>
+                  <a:tcPr/>
+                </a:tc>
+                <a:extLst>
+                  <a:ext uri="{0D108BD9-81ED-4DB2-BD59-A6C34878D82A}">
+                    <a16:rowId xmlns:a16="http://schemas.microsoft.com/office/drawing/2014/main" val="500512636"/>
+                  </a:ext>
+                </a:extLst>
+              </a:tr>
+              <a:tr h="370840">
+                <a:tc>
+                  <a:txBody>
+                    <a:bodyPr/>
+                    <a:lstStyle/>
+                    <a:p>
+                      <a:pPr algn="ctr"/>
+                      <a:r>
+                        <a:rPr lang="en-CA" dirty="0"/>
+                        <a:t>0.4</a:t>
+                      </a:r>
+                      <a:endParaRPr lang="en-US" dirty="0"/>
+                    </a:p>
+                  </a:txBody>
+                  <a:tcPr/>
+                </a:tc>
+                <a:tc>
+                  <a:txBody>
+                    <a:bodyPr/>
+                    <a:lstStyle/>
+                    <a:p>
+                      <a:pPr algn="ctr"/>
+                      <a:r>
+                        <a:rPr lang="en-US" b="0" dirty="0">
+                          <a:solidFill>
+                            <a:schemeClr val="tx1"/>
+                          </a:solidFill>
+                        </a:rPr>
+                        <a:t>20.35</a:t>
+                      </a:r>
+                    </a:p>
+                  </a:txBody>
+                  <a:tcPr/>
+                </a:tc>
+                <a:tc>
+                  <a:txBody>
+                    <a:bodyPr/>
+                    <a:lstStyle/>
+                    <a:p>
+                      <a:pPr algn="ctr"/>
+                      <a:r>
+                        <a:rPr lang="en-US" b="0" dirty="0">
+                          <a:solidFill>
+                            <a:schemeClr val="tx1"/>
+                          </a:solidFill>
+                        </a:rPr>
+                        <a:t>17.05</a:t>
+                      </a:r>
+                    </a:p>
+                  </a:txBody>
+                  <a:tcPr/>
+                </a:tc>
+                <a:tc>
+                  <a:txBody>
+                    <a:bodyPr/>
+                    <a:lstStyle/>
+                    <a:p>
+                      <a:pPr algn="ctr"/>
+                      <a:r>
+                        <a:rPr lang="en-US" b="0" dirty="0">
+                          <a:solidFill>
+                            <a:schemeClr val="tx1"/>
+                          </a:solidFill>
+                        </a:rPr>
+                        <a:t>21.12</a:t>
+                      </a:r>
+                    </a:p>
+                  </a:txBody>
+                  <a:tcPr/>
+                </a:tc>
+                <a:tc>
+                  <a:txBody>
+                    <a:bodyPr/>
+                    <a:lstStyle/>
+                    <a:p>
+                      <a:pPr algn="ctr"/>
+                      <a:r>
+                        <a:rPr lang="en-US" b="0" dirty="0">
+                          <a:solidFill>
+                            <a:schemeClr val="tx1"/>
+                          </a:solidFill>
+                        </a:rPr>
+                        <a:t>19.88</a:t>
+                      </a:r>
+                    </a:p>
+                  </a:txBody>
+                  <a:tcPr/>
+                </a:tc>
+                <a:tc>
+                  <a:txBody>
+                    <a:bodyPr/>
+                    <a:lstStyle/>
+                    <a:p>
+                      <a:pPr algn="ctr"/>
+                      <a:r>
+                        <a:rPr lang="en-US" b="0" dirty="0">
+                          <a:solidFill>
+                            <a:schemeClr val="tx1"/>
+                          </a:solidFill>
+                        </a:rPr>
+                        <a:t>20.91</a:t>
+                      </a:r>
+                    </a:p>
+                  </a:txBody>
+                  <a:tcPr/>
+                </a:tc>
+                <a:extLst>
+                  <a:ext uri="{0D108BD9-81ED-4DB2-BD59-A6C34878D82A}">
+                    <a16:rowId xmlns:a16="http://schemas.microsoft.com/office/drawing/2014/main" val="3758659780"/>
+                  </a:ext>
+                </a:extLst>
+              </a:tr>
+              <a:tr h="370840">
+                <a:tc>
+                  <a:txBody>
+                    <a:bodyPr/>
+                    <a:lstStyle/>
+                    <a:p>
+                      <a:pPr algn="ctr"/>
+                      <a:r>
+                        <a:rPr lang="en-CA" dirty="0"/>
+                        <a:t>0.5</a:t>
+                      </a:r>
+                      <a:endParaRPr lang="en-US" dirty="0"/>
+                    </a:p>
+                  </a:txBody>
+                  <a:tcPr/>
+                </a:tc>
+                <a:tc>
+                  <a:txBody>
+                    <a:bodyPr/>
+                    <a:lstStyle/>
+                    <a:p>
+                      <a:pPr algn="ctr"/>
+                      <a:r>
+                        <a:rPr lang="en-US" b="0" dirty="0">
+                          <a:solidFill>
+                            <a:schemeClr val="tx1"/>
+                          </a:solidFill>
+                        </a:rPr>
+                        <a:t>12.35</a:t>
+                      </a:r>
+                    </a:p>
+                  </a:txBody>
+                  <a:tcPr/>
+                </a:tc>
+                <a:tc>
+                  <a:txBody>
+                    <a:bodyPr/>
+                    <a:lstStyle/>
+                    <a:p>
+                      <a:pPr algn="ctr"/>
+                      <a:r>
+                        <a:rPr lang="en-US" b="0" dirty="0">
+                          <a:solidFill>
+                            <a:schemeClr val="tx1"/>
+                          </a:solidFill>
+                        </a:rPr>
+                        <a:t>12.39</a:t>
+                      </a:r>
+                    </a:p>
+                  </a:txBody>
+                  <a:tcPr/>
+                </a:tc>
+                <a:tc>
+                  <a:txBody>
+                    <a:bodyPr/>
+                    <a:lstStyle/>
+                    <a:p>
+                      <a:pPr algn="ctr"/>
+                      <a:r>
+                        <a:rPr lang="en-US" b="0" dirty="0">
+                          <a:solidFill>
+                            <a:schemeClr val="tx1"/>
+                          </a:solidFill>
+                        </a:rPr>
+                        <a:t>12.13</a:t>
+                      </a:r>
+                    </a:p>
+                  </a:txBody>
+                  <a:tcPr/>
+                </a:tc>
+                <a:tc>
+                  <a:txBody>
+                    <a:bodyPr/>
+                    <a:lstStyle/>
+                    <a:p>
+                      <a:pPr algn="ctr"/>
+                      <a:r>
+                        <a:rPr lang="en-US" b="0" dirty="0">
+                          <a:solidFill>
+                            <a:schemeClr val="tx1"/>
+                          </a:solidFill>
+                        </a:rPr>
+                        <a:t>11.02</a:t>
+                      </a:r>
+                    </a:p>
+                  </a:txBody>
+                  <a:tcPr/>
+                </a:tc>
+                <a:tc>
+                  <a:txBody>
+                    <a:bodyPr/>
+                    <a:lstStyle/>
+                    <a:p>
+                      <a:pPr algn="ctr"/>
+                      <a:r>
+                        <a:rPr lang="en-US" b="0" dirty="0">
+                          <a:solidFill>
+                            <a:schemeClr val="tx1"/>
+                          </a:solidFill>
+                        </a:rPr>
+                        <a:t>12.77</a:t>
+                      </a:r>
+                    </a:p>
+                  </a:txBody>
+                  <a:tcPr/>
+                </a:tc>
+                <a:extLst>
+                  <a:ext uri="{0D108BD9-81ED-4DB2-BD59-A6C34878D82A}">
+                    <a16:rowId xmlns:a16="http://schemas.microsoft.com/office/drawing/2014/main" val="1626020330"/>
+                  </a:ext>
+                </a:extLst>
+              </a:tr>
+              <a:tr h="370840">
+                <a:tc>
+                  <a:txBody>
+                    <a:bodyPr/>
+                    <a:lstStyle/>
+                    <a:p>
+                      <a:pPr algn="ctr"/>
+                      <a:r>
+                        <a:rPr lang="en-US" dirty="0"/>
+                        <a:t>0.6</a:t>
+                      </a:r>
+                    </a:p>
+                  </a:txBody>
+                  <a:tcPr/>
+                </a:tc>
+                <a:tc>
+                  <a:txBody>
+                    <a:bodyPr/>
+                    <a:lstStyle/>
+                    <a:p>
+                      <a:pPr algn="ctr"/>
+                      <a:r>
+                        <a:rPr lang="en-US" b="0" dirty="0">
+                          <a:solidFill>
+                            <a:schemeClr val="tx1"/>
+                          </a:solidFill>
+                        </a:rPr>
+                        <a:t>10.22</a:t>
+                      </a:r>
+                    </a:p>
+                  </a:txBody>
+                  <a:tcPr/>
+                </a:tc>
+                <a:tc>
+                  <a:txBody>
+                    <a:bodyPr/>
+                    <a:lstStyle/>
+                    <a:p>
+                      <a:pPr algn="ctr"/>
+                      <a:r>
+                        <a:rPr lang="en-US" b="1" dirty="0">
+                          <a:solidFill>
+                            <a:srgbClr val="00B050"/>
+                          </a:solidFill>
+                        </a:rPr>
+                        <a:t>9.26</a:t>
+                      </a:r>
+                    </a:p>
+                  </a:txBody>
+                  <a:tcPr/>
+                </a:tc>
+                <a:tc>
+                  <a:txBody>
+                    <a:bodyPr/>
+                    <a:lstStyle/>
+                    <a:p>
+                      <a:pPr algn="ctr"/>
+                      <a:r>
+                        <a:rPr lang="en-US" b="1" dirty="0">
+                          <a:solidFill>
+                            <a:srgbClr val="00B050"/>
+                          </a:solidFill>
+                        </a:rPr>
+                        <a:t>9.18</a:t>
+                      </a:r>
+                    </a:p>
+                  </a:txBody>
+                  <a:tcPr/>
+                </a:tc>
+                <a:tc>
+                  <a:txBody>
+                    <a:bodyPr/>
+                    <a:lstStyle/>
+                    <a:p>
+                      <a:pPr algn="ctr"/>
+                      <a:r>
+                        <a:rPr lang="en-US" b="0" dirty="0">
+                          <a:solidFill>
+                            <a:schemeClr val="tx1"/>
+                          </a:solidFill>
+                        </a:rPr>
+                        <a:t>14.43</a:t>
+                      </a:r>
+                    </a:p>
+                  </a:txBody>
+                  <a:tcPr/>
+                </a:tc>
+                <a:tc>
+                  <a:txBody>
+                    <a:bodyPr/>
+                    <a:lstStyle/>
+                    <a:p>
+                      <a:pPr algn="ctr"/>
+                      <a:r>
+                        <a:rPr lang="en-US" b="0" dirty="0">
+                          <a:solidFill>
+                            <a:schemeClr val="tx1"/>
+                          </a:solidFill>
+                        </a:rPr>
+                        <a:t>9.56</a:t>
+                      </a:r>
+                    </a:p>
+                  </a:txBody>
+                  <a:tcPr/>
+                </a:tc>
+                <a:extLst>
+                  <a:ext uri="{0D108BD9-81ED-4DB2-BD59-A6C34878D82A}">
+                    <a16:rowId xmlns:a16="http://schemas.microsoft.com/office/drawing/2014/main" val="1821397987"/>
+                  </a:ext>
+                </a:extLst>
+              </a:tr>
+              <a:tr h="370840">
+                <a:tc>
+                  <a:txBody>
+                    <a:bodyPr/>
+                    <a:lstStyle/>
+                    <a:p>
+                      <a:pPr algn="ctr"/>
+                      <a:r>
+                        <a:rPr lang="en-US" dirty="0"/>
+                        <a:t>0.7</a:t>
+                      </a:r>
+                    </a:p>
+                  </a:txBody>
+                  <a:tcPr/>
+                </a:tc>
+                <a:tc>
+                  <a:txBody>
+                    <a:bodyPr/>
+                    <a:lstStyle/>
+                    <a:p>
+                      <a:pPr algn="ctr"/>
+                      <a:r>
+                        <a:rPr lang="en-US" b="0" dirty="0">
+                          <a:solidFill>
+                            <a:schemeClr val="tx1"/>
+                          </a:solidFill>
+                        </a:rPr>
+                        <a:t>11.21</a:t>
+                      </a:r>
+                    </a:p>
+                  </a:txBody>
+                  <a:tcPr/>
+                </a:tc>
+                <a:tc>
+                  <a:txBody>
+                    <a:bodyPr/>
+                    <a:lstStyle/>
+                    <a:p>
+                      <a:pPr algn="ctr"/>
+                      <a:r>
+                        <a:rPr lang="en-US" b="0" dirty="0">
+                          <a:solidFill>
+                            <a:schemeClr val="tx1"/>
+                          </a:solidFill>
+                        </a:rPr>
+                        <a:t>10.12</a:t>
+                      </a:r>
+                    </a:p>
+                  </a:txBody>
+                  <a:tcPr/>
+                </a:tc>
+                <a:tc>
+                  <a:txBody>
+                    <a:bodyPr/>
+                    <a:lstStyle/>
+                    <a:p>
+                      <a:pPr algn="ctr"/>
+                      <a:r>
+                        <a:rPr lang="en-US" b="0" dirty="0">
+                          <a:solidFill>
+                            <a:schemeClr val="tx1"/>
+                          </a:solidFill>
+                        </a:rPr>
+                        <a:t>10.24</a:t>
+                      </a:r>
+                    </a:p>
+                  </a:txBody>
+                  <a:tcPr/>
+                </a:tc>
+                <a:tc>
+                  <a:txBody>
+                    <a:bodyPr/>
+                    <a:lstStyle/>
+                    <a:p>
+                      <a:pPr algn="ctr"/>
+                      <a:r>
+                        <a:rPr lang="en-US" b="0" dirty="0">
+                          <a:solidFill>
+                            <a:schemeClr val="tx1"/>
+                          </a:solidFill>
+                        </a:rPr>
+                        <a:t>10.19</a:t>
+                      </a:r>
+                    </a:p>
+                  </a:txBody>
+                  <a:tcPr/>
+                </a:tc>
+                <a:tc>
+                  <a:txBody>
+                    <a:bodyPr/>
+                    <a:lstStyle/>
+                    <a:p>
+                      <a:pPr algn="ctr"/>
+                      <a:r>
+                        <a:rPr lang="en-US" b="0" dirty="0">
+                          <a:solidFill>
+                            <a:schemeClr val="tx1"/>
+                          </a:solidFill>
+                        </a:rPr>
+                        <a:t>13.07</a:t>
+                      </a:r>
+                    </a:p>
+                  </a:txBody>
+                  <a:tcPr/>
+                </a:tc>
+                <a:extLst>
+                  <a:ext uri="{0D108BD9-81ED-4DB2-BD59-A6C34878D82A}">
+                    <a16:rowId xmlns:a16="http://schemas.microsoft.com/office/drawing/2014/main" val="1286527859"/>
+                  </a:ext>
+                </a:extLst>
+              </a:tr>
+            </a:tbl>
+          </a:graphicData>
+        </a:graphic>
+      </p:graphicFrame>
+    </p:spTree>
+    <p:extLst>
+      <p:ext uri="{BB962C8B-B14F-4D97-AF65-F5344CB8AC3E}">
+        <p14:creationId xmlns:p14="http://schemas.microsoft.com/office/powerpoint/2010/main" val="1479242332"/>
+      </p:ext>
+    </p:extLst>
+  </p:cSld>
+  <p:clrMapOvr>
+    <a:masterClrMapping/>
+  </p:clrMapOvr>
+</p:sld>
+</file>
+
+<file path=ppt/slides/slide9.xml><?xml version="1.0" encoding="utf-8"?>
+<p:sld xmlns:a="http://schemas.openxmlformats.org/drawingml/2006/main" xmlns:r="http://schemas.openxmlformats.org/officeDocument/2006/relationships" xmlns:p="http://schemas.openxmlformats.org/presentationml/2006/main">
+  <p:cSld>
+    <p:spTree>
+      <p:nvGrpSpPr>
+        <p:cNvPr id="1" name=""/>
+        <p:cNvGrpSpPr/>
+        <p:nvPr/>
+      </p:nvGrpSpPr>
+      <p:grpSpPr>
+        <a:xfrm>
+          <a:off x="0" y="0"/>
+          <a:ext cx="0" cy="0"/>
+          <a:chOff x="0" y="0"/>
+          <a:chExt cx="0" cy="0"/>
+        </a:xfrm>
+      </p:grpSpPr>
+      <p:pic>
+        <p:nvPicPr>
+          <p:cNvPr id="5" name="Picture 4">
+            <a:extLst>
+              <a:ext uri="{FF2B5EF4-FFF2-40B4-BE49-F238E27FC236}">
+                <a16:creationId xmlns:a16="http://schemas.microsoft.com/office/drawing/2014/main" id="{7F34DA1B-CF13-43F7-A843-25DB4D7A516E}"/>
+              </a:ext>
+            </a:extLst>
+          </p:cNvPr>
+          <p:cNvPicPr>
+            <a:picLocks noChangeAspect="1"/>
+          </p:cNvPicPr>
+          <p:nvPr/>
+        </p:nvPicPr>
+        <p:blipFill>
+          <a:blip r:embed="rId2"/>
+          <a:stretch>
+            <a:fillRect/>
+          </a:stretch>
+        </p:blipFill>
+        <p:spPr>
+          <a:xfrm>
+            <a:off x="1632878" y="261169"/>
+            <a:ext cx="8926243" cy="6335661"/>
+          </a:xfrm>
+          <a:prstGeom prst="rect">
+            <a:avLst/>
+          </a:prstGeom>
+        </p:spPr>
+      </p:pic>
+    </p:spTree>
+    <p:extLst>
+      <p:ext uri="{BB962C8B-B14F-4D97-AF65-F5344CB8AC3E}">
+        <p14:creationId xmlns:p14="http://schemas.microsoft.com/office/powerpoint/2010/main" val="1911781013"/>
       </p:ext>
     </p:extLst>
   </p:cSld>

</xml_diff>

<commit_message>
clustering algorithms for ventilation allocation
</commit_message>
<xml_diff>
--- a/preliminary_results.pptx
+++ b/preliminary_results.pptx
@@ -5,7 +5,7 @@
     <p:sldMasterId id="2147483648" r:id="rId1"/>
   </p:sldMasterIdLst>
   <p:notesMasterIdLst>
-    <p:notesMasterId r:id="rId19"/>
+    <p:notesMasterId r:id="rId27"/>
   </p:notesMasterIdLst>
   <p:sldIdLst>
     <p:sldId id="257" r:id="rId2"/>
@@ -25,6 +25,14 @@
     <p:sldId id="272" r:id="rId16"/>
     <p:sldId id="273" r:id="rId17"/>
     <p:sldId id="275" r:id="rId18"/>
+    <p:sldId id="278" r:id="rId19"/>
+    <p:sldId id="277" r:id="rId20"/>
+    <p:sldId id="279" r:id="rId21"/>
+    <p:sldId id="280" r:id="rId22"/>
+    <p:sldId id="281" r:id="rId23"/>
+    <p:sldId id="286" r:id="rId24"/>
+    <p:sldId id="289" r:id="rId25"/>
+    <p:sldId id="288" r:id="rId26"/>
   </p:sldIdLst>
   <p:sldSz cx="12192000" cy="6858000"/>
   <p:notesSz cx="6858000" cy="9144000"/>
@@ -213,7 +221,7 @@
           <a:p>
             <a:fld id="{76CCFABF-3CA8-4256-B73B-5FC3FF2A7370}" type="datetimeFigureOut">
               <a:rPr lang="en-US" smtClean="0"/>
-              <a:t>11/21/2021</a:t>
+              <a:t>11/24/2021</a:t>
             </a:fld>
             <a:endParaRPr lang="en-US"/>
           </a:p>
@@ -711,7 +719,7 @@
           <a:p>
             <a:fld id="{BE24606C-7E03-4216-B317-9143B9B2995A}" type="datetimeFigureOut">
               <a:rPr lang="en-US" smtClean="0"/>
-              <a:t>11/21/2021</a:t>
+              <a:t>11/24/2021</a:t>
             </a:fld>
             <a:endParaRPr lang="en-US"/>
           </a:p>
@@ -909,7 +917,7 @@
           <a:p>
             <a:fld id="{BE24606C-7E03-4216-B317-9143B9B2995A}" type="datetimeFigureOut">
               <a:rPr lang="en-US" smtClean="0"/>
-              <a:t>11/21/2021</a:t>
+              <a:t>11/24/2021</a:t>
             </a:fld>
             <a:endParaRPr lang="en-US"/>
           </a:p>
@@ -1117,7 +1125,7 @@
           <a:p>
             <a:fld id="{BE24606C-7E03-4216-B317-9143B9B2995A}" type="datetimeFigureOut">
               <a:rPr lang="en-US" smtClean="0"/>
-              <a:t>11/21/2021</a:t>
+              <a:t>11/24/2021</a:t>
             </a:fld>
             <a:endParaRPr lang="en-US"/>
           </a:p>
@@ -1315,7 +1323,7 @@
           <a:p>
             <a:fld id="{BE24606C-7E03-4216-B317-9143B9B2995A}" type="datetimeFigureOut">
               <a:rPr lang="en-US" smtClean="0"/>
-              <a:t>11/21/2021</a:t>
+              <a:t>11/24/2021</a:t>
             </a:fld>
             <a:endParaRPr lang="en-US"/>
           </a:p>
@@ -1590,7 +1598,7 @@
           <a:p>
             <a:fld id="{BE24606C-7E03-4216-B317-9143B9B2995A}" type="datetimeFigureOut">
               <a:rPr lang="en-US" smtClean="0"/>
-              <a:t>11/21/2021</a:t>
+              <a:t>11/24/2021</a:t>
             </a:fld>
             <a:endParaRPr lang="en-US"/>
           </a:p>
@@ -1855,7 +1863,7 @@
           <a:p>
             <a:fld id="{BE24606C-7E03-4216-B317-9143B9B2995A}" type="datetimeFigureOut">
               <a:rPr lang="en-US" smtClean="0"/>
-              <a:t>11/21/2021</a:t>
+              <a:t>11/24/2021</a:t>
             </a:fld>
             <a:endParaRPr lang="en-US"/>
           </a:p>
@@ -2267,7 +2275,7 @@
           <a:p>
             <a:fld id="{BE24606C-7E03-4216-B317-9143B9B2995A}" type="datetimeFigureOut">
               <a:rPr lang="en-US" smtClean="0"/>
-              <a:t>11/21/2021</a:t>
+              <a:t>11/24/2021</a:t>
             </a:fld>
             <a:endParaRPr lang="en-US"/>
           </a:p>
@@ -2408,7 +2416,7 @@
           <a:p>
             <a:fld id="{BE24606C-7E03-4216-B317-9143B9B2995A}" type="datetimeFigureOut">
               <a:rPr lang="en-US" smtClean="0"/>
-              <a:t>11/21/2021</a:t>
+              <a:t>11/24/2021</a:t>
             </a:fld>
             <a:endParaRPr lang="en-US"/>
           </a:p>
@@ -2521,7 +2529,7 @@
           <a:p>
             <a:fld id="{BE24606C-7E03-4216-B317-9143B9B2995A}" type="datetimeFigureOut">
               <a:rPr lang="en-US" smtClean="0"/>
-              <a:t>11/21/2021</a:t>
+              <a:t>11/24/2021</a:t>
             </a:fld>
             <a:endParaRPr lang="en-US"/>
           </a:p>
@@ -2832,7 +2840,7 @@
           <a:p>
             <a:fld id="{BE24606C-7E03-4216-B317-9143B9B2995A}" type="datetimeFigureOut">
               <a:rPr lang="en-US" smtClean="0"/>
-              <a:t>11/21/2021</a:t>
+              <a:t>11/24/2021</a:t>
             </a:fld>
             <a:endParaRPr lang="en-US"/>
           </a:p>
@@ -3120,7 +3128,7 @@
           <a:p>
             <a:fld id="{BE24606C-7E03-4216-B317-9143B9B2995A}" type="datetimeFigureOut">
               <a:rPr lang="en-US" smtClean="0"/>
-              <a:t>11/21/2021</a:t>
+              <a:t>11/24/2021</a:t>
             </a:fld>
             <a:endParaRPr lang="en-US"/>
           </a:p>
@@ -3361,7 +3369,7 @@
           <a:p>
             <a:fld id="{BE24606C-7E03-4216-B317-9143B9B2995A}" type="datetimeFigureOut">
               <a:rPr lang="en-US" smtClean="0"/>
-              <a:t>11/21/2021</a:t>
+              <a:t>11/24/2021</a:t>
             </a:fld>
             <a:endParaRPr lang="en-US"/>
           </a:p>
@@ -5294,6 +5302,196 @@
 </p:sld>
 </file>
 
+<file path=ppt/slides/slide18.xml><?xml version="1.0" encoding="utf-8"?>
+<p:sld xmlns:a="http://schemas.openxmlformats.org/drawingml/2006/main" xmlns:r="http://schemas.openxmlformats.org/officeDocument/2006/relationships" xmlns:p="http://schemas.openxmlformats.org/presentationml/2006/main">
+  <p:cSld>
+    <p:spTree>
+      <p:nvGrpSpPr>
+        <p:cNvPr id="1" name=""/>
+        <p:cNvGrpSpPr/>
+        <p:nvPr/>
+      </p:nvGrpSpPr>
+      <p:grpSpPr>
+        <a:xfrm>
+          <a:off x="0" y="0"/>
+          <a:ext cx="0" cy="0"/>
+          <a:chOff x="0" y="0"/>
+          <a:chExt cx="0" cy="0"/>
+        </a:xfrm>
+      </p:grpSpPr>
+      <p:sp>
+        <p:nvSpPr>
+          <p:cNvPr id="2" name="Title 1">
+            <a:extLst>
+              <a:ext uri="{FF2B5EF4-FFF2-40B4-BE49-F238E27FC236}">
+                <a16:creationId xmlns:a16="http://schemas.microsoft.com/office/drawing/2014/main" id="{F76D8DE2-F906-4C8A-A1E7-6D8FC6958962}"/>
+              </a:ext>
+            </a:extLst>
+          </p:cNvPr>
+          <p:cNvSpPr>
+            <a:spLocks noGrp="1"/>
+          </p:cNvSpPr>
+          <p:nvPr>
+            <p:ph type="title"/>
+          </p:nvPr>
+        </p:nvSpPr>
+        <p:spPr/>
+        <p:txBody>
+          <a:bodyPr/>
+          <a:lstStyle/>
+          <a:p>
+            <a:r>
+              <a:rPr lang="en-US" dirty="0"/>
+              <a:t>Ventilator Allocation Problem</a:t>
+            </a:r>
+          </a:p>
+        </p:txBody>
+      </p:sp>
+    </p:spTree>
+    <p:extLst>
+      <p:ext uri="{BB962C8B-B14F-4D97-AF65-F5344CB8AC3E}">
+        <p14:creationId xmlns:p14="http://schemas.microsoft.com/office/powerpoint/2010/main" val="4081321582"/>
+      </p:ext>
+    </p:extLst>
+  </p:cSld>
+  <p:clrMapOvr>
+    <a:masterClrMapping/>
+  </p:clrMapOvr>
+</p:sld>
+</file>
+
+<file path=ppt/slides/slide19.xml><?xml version="1.0" encoding="utf-8"?>
+<p:sld xmlns:a="http://schemas.openxmlformats.org/drawingml/2006/main" xmlns:r="http://schemas.openxmlformats.org/officeDocument/2006/relationships" xmlns:p="http://schemas.openxmlformats.org/presentationml/2006/main">
+  <p:cSld>
+    <p:spTree>
+      <p:nvGrpSpPr>
+        <p:cNvPr id="1" name=""/>
+        <p:cNvGrpSpPr/>
+        <p:nvPr/>
+      </p:nvGrpSpPr>
+      <p:grpSpPr>
+        <a:xfrm>
+          <a:off x="0" y="0"/>
+          <a:ext cx="0" cy="0"/>
+          <a:chOff x="0" y="0"/>
+          <a:chExt cx="0" cy="0"/>
+        </a:xfrm>
+      </p:grpSpPr>
+      <p:sp>
+        <p:nvSpPr>
+          <p:cNvPr id="2" name="Title 1">
+            <a:extLst>
+              <a:ext uri="{FF2B5EF4-FFF2-40B4-BE49-F238E27FC236}">
+                <a16:creationId xmlns:a16="http://schemas.microsoft.com/office/drawing/2014/main" id="{5DB94126-3787-40C3-B8A7-5EE132B3E90A}"/>
+              </a:ext>
+            </a:extLst>
+          </p:cNvPr>
+          <p:cNvSpPr>
+            <a:spLocks noGrp="1"/>
+          </p:cNvSpPr>
+          <p:nvPr>
+            <p:ph type="title"/>
+          </p:nvPr>
+        </p:nvSpPr>
+        <p:spPr/>
+        <p:txBody>
+          <a:bodyPr/>
+          <a:lstStyle/>
+          <a:p>
+            <a:r>
+              <a:rPr lang="en-US" dirty="0"/>
+              <a:t>Preliminary Results (1)</a:t>
+            </a:r>
+          </a:p>
+        </p:txBody>
+      </p:sp>
+      <p:sp>
+        <p:nvSpPr>
+          <p:cNvPr id="3" name="Content Placeholder 2">
+            <a:extLst>
+              <a:ext uri="{FF2B5EF4-FFF2-40B4-BE49-F238E27FC236}">
+                <a16:creationId xmlns:a16="http://schemas.microsoft.com/office/drawing/2014/main" id="{F0FB2854-1D5D-4AE6-90F0-188FCA3D74B6}"/>
+              </a:ext>
+            </a:extLst>
+          </p:cNvPr>
+          <p:cNvSpPr>
+            <a:spLocks noGrp="1"/>
+          </p:cNvSpPr>
+          <p:nvPr>
+            <p:ph idx="1"/>
+          </p:nvPr>
+        </p:nvSpPr>
+        <p:spPr/>
+        <p:txBody>
+          <a:bodyPr/>
+          <a:lstStyle/>
+          <a:p>
+            <a:r>
+              <a:rPr lang="en-US" dirty="0"/>
+              <a:t>N = 20, K = 500</a:t>
+            </a:r>
+          </a:p>
+          <a:p>
+            <a:r>
+              <a:rPr lang="en-US" dirty="0"/>
+              <a:t>Aggregate cuts based on </a:t>
+            </a:r>
+            <a:r>
+              <a:rPr lang="en-US" b="1" dirty="0"/>
+              <a:t>dual solutions </a:t>
+            </a:r>
+            <a:r>
+              <a:rPr lang="en-US" dirty="0"/>
+              <a:t>and </a:t>
+            </a:r>
+            <a:r>
+              <a:rPr lang="en-US" b="1" dirty="0"/>
+              <a:t>objective values</a:t>
+            </a:r>
+          </a:p>
+          <a:p>
+            <a:r>
+              <a:rPr lang="en-US" dirty="0"/>
+              <a:t>3-trial average:</a:t>
+            </a:r>
+          </a:p>
+          <a:p>
+            <a:pPr lvl="1"/>
+            <a:r>
+              <a:rPr lang="en-US" dirty="0" err="1"/>
+              <a:t>MultiCut</a:t>
+            </a:r>
+            <a:r>
+              <a:rPr lang="en-US" dirty="0"/>
+              <a:t>: 7.56 s</a:t>
+            </a:r>
+          </a:p>
+          <a:p>
+            <a:pPr lvl="1"/>
+            <a:r>
+              <a:rPr lang="en-US" dirty="0" err="1"/>
+              <a:t>SingleCut</a:t>
+            </a:r>
+            <a:r>
+              <a:rPr lang="en-US" dirty="0"/>
+              <a:t>: 141.60 s</a:t>
+            </a:r>
+          </a:p>
+        </p:txBody>
+      </p:sp>
+    </p:spTree>
+    <p:extLst>
+      <p:ext uri="{BB962C8B-B14F-4D97-AF65-F5344CB8AC3E}">
+        <p14:creationId xmlns:p14="http://schemas.microsoft.com/office/powerpoint/2010/main" val="4145802355"/>
+      </p:ext>
+    </p:extLst>
+  </p:cSld>
+  <p:clrMapOvr>
+    <a:masterClrMapping/>
+  </p:clrMapOvr>
+</p:sld>
+</file>
+
 <file path=ppt/slides/slide2.xml><?xml version="1.0" encoding="utf-8"?>
 <p:sld xmlns:a="http://schemas.openxmlformats.org/drawingml/2006/main" xmlns:r="http://schemas.openxmlformats.org/officeDocument/2006/relationships" xmlns:p="http://schemas.openxmlformats.org/presentationml/2006/main">
   <p:cSld>
@@ -6375,6 +6573,1386 @@
     <p:extLst>
       <p:ext uri="{BB962C8B-B14F-4D97-AF65-F5344CB8AC3E}">
         <p14:creationId xmlns:p14="http://schemas.microsoft.com/office/powerpoint/2010/main" val="904624943"/>
+      </p:ext>
+    </p:extLst>
+  </p:cSld>
+  <p:clrMapOvr>
+    <a:masterClrMapping/>
+  </p:clrMapOvr>
+</p:sld>
+</file>
+
+<file path=ppt/slides/slide20.xml><?xml version="1.0" encoding="utf-8"?>
+<p:sld xmlns:a="http://schemas.openxmlformats.org/drawingml/2006/main" xmlns:r="http://schemas.openxmlformats.org/officeDocument/2006/relationships" xmlns:p="http://schemas.openxmlformats.org/presentationml/2006/main">
+  <p:cSld>
+    <p:spTree>
+      <p:nvGrpSpPr>
+        <p:cNvPr id="1" name=""/>
+        <p:cNvGrpSpPr/>
+        <p:nvPr/>
+      </p:nvGrpSpPr>
+      <p:grpSpPr>
+        <a:xfrm>
+          <a:off x="0" y="0"/>
+          <a:ext cx="0" cy="0"/>
+          <a:chOff x="0" y="0"/>
+          <a:chExt cx="0" cy="0"/>
+        </a:xfrm>
+      </p:grpSpPr>
+      <p:sp>
+        <p:nvSpPr>
+          <p:cNvPr id="2" name="Title 1">
+            <a:extLst>
+              <a:ext uri="{FF2B5EF4-FFF2-40B4-BE49-F238E27FC236}">
+                <a16:creationId xmlns:a16="http://schemas.microsoft.com/office/drawing/2014/main" id="{8A89EF12-28C1-49E8-8309-899E02CA219C}"/>
+              </a:ext>
+            </a:extLst>
+          </p:cNvPr>
+          <p:cNvSpPr>
+            <a:spLocks noGrp="1"/>
+          </p:cNvSpPr>
+          <p:nvPr>
+            <p:ph type="title"/>
+          </p:nvPr>
+        </p:nvSpPr>
+        <p:spPr/>
+        <p:txBody>
+          <a:bodyPr/>
+          <a:lstStyle/>
+          <a:p>
+            <a:r>
+              <a:rPr lang="en-US" dirty="0"/>
+              <a:t>Computational Results</a:t>
+            </a:r>
+          </a:p>
+        </p:txBody>
+      </p:sp>
+      <p:pic>
+        <p:nvPicPr>
+          <p:cNvPr id="5" name="Picture 4">
+            <a:extLst>
+              <a:ext uri="{FF2B5EF4-FFF2-40B4-BE49-F238E27FC236}">
+                <a16:creationId xmlns:a16="http://schemas.microsoft.com/office/drawing/2014/main" id="{F7B191CE-7B36-4CF9-B088-046C3A0092DA}"/>
+              </a:ext>
+            </a:extLst>
+          </p:cNvPr>
+          <p:cNvPicPr>
+            <a:picLocks noChangeAspect="1"/>
+          </p:cNvPicPr>
+          <p:nvPr/>
+        </p:nvPicPr>
+        <p:blipFill>
+          <a:blip r:embed="rId2"/>
+          <a:stretch>
+            <a:fillRect/>
+          </a:stretch>
+        </p:blipFill>
+        <p:spPr>
+          <a:xfrm>
+            <a:off x="2275942" y="1709497"/>
+            <a:ext cx="7640116" cy="3439005"/>
+          </a:xfrm>
+          <a:prstGeom prst="rect">
+            <a:avLst/>
+          </a:prstGeom>
+        </p:spPr>
+      </p:pic>
+      <p:sp>
+        <p:nvSpPr>
+          <p:cNvPr id="6" name="Rectangle 5">
+            <a:extLst>
+              <a:ext uri="{FF2B5EF4-FFF2-40B4-BE49-F238E27FC236}">
+                <a16:creationId xmlns:a16="http://schemas.microsoft.com/office/drawing/2014/main" id="{DC77C8D3-A247-4E07-A66C-3DA9770CA9ED}"/>
+              </a:ext>
+            </a:extLst>
+          </p:cNvPr>
+          <p:cNvSpPr/>
+          <p:nvPr/>
+        </p:nvSpPr>
+        <p:spPr>
+          <a:xfrm>
+            <a:off x="9584869" y="1489980"/>
+            <a:ext cx="416379" cy="3878035"/>
+          </a:xfrm>
+          <a:prstGeom prst="rect">
+            <a:avLst/>
+          </a:prstGeom>
+          <a:noFill/>
+          <a:ln>
+            <a:solidFill>
+              <a:srgbClr val="FF0000"/>
+            </a:solidFill>
+          </a:ln>
+        </p:spPr>
+        <p:style>
+          <a:lnRef idx="2">
+            <a:schemeClr val="accent1">
+              <a:shade val="50000"/>
+            </a:schemeClr>
+          </a:lnRef>
+          <a:fillRef idx="1">
+            <a:schemeClr val="accent1"/>
+          </a:fillRef>
+          <a:effectRef idx="0">
+            <a:schemeClr val="accent1"/>
+          </a:effectRef>
+          <a:fontRef idx="minor">
+            <a:schemeClr val="lt1"/>
+          </a:fontRef>
+        </p:style>
+        <p:txBody>
+          <a:bodyPr rtlCol="0" anchor="ctr"/>
+          <a:lstStyle/>
+          <a:p>
+            <a:pPr algn="ctr"/>
+            <a:endParaRPr lang="en-US"/>
+          </a:p>
+        </p:txBody>
+      </p:sp>
+      <p:sp>
+        <p:nvSpPr>
+          <p:cNvPr id="7" name="Rectangle 6">
+            <a:extLst>
+              <a:ext uri="{FF2B5EF4-FFF2-40B4-BE49-F238E27FC236}">
+                <a16:creationId xmlns:a16="http://schemas.microsoft.com/office/drawing/2014/main" id="{238F24B3-003F-45DD-BDC7-DB59852E9017}"/>
+              </a:ext>
+            </a:extLst>
+          </p:cNvPr>
+          <p:cNvSpPr/>
+          <p:nvPr/>
+        </p:nvSpPr>
+        <p:spPr>
+          <a:xfrm>
+            <a:off x="6879771" y="1489981"/>
+            <a:ext cx="647700" cy="3878035"/>
+          </a:xfrm>
+          <a:prstGeom prst="rect">
+            <a:avLst/>
+          </a:prstGeom>
+          <a:noFill/>
+          <a:ln>
+            <a:solidFill>
+              <a:srgbClr val="FF0000"/>
+            </a:solidFill>
+          </a:ln>
+        </p:spPr>
+        <p:style>
+          <a:lnRef idx="2">
+            <a:schemeClr val="accent1">
+              <a:shade val="50000"/>
+            </a:schemeClr>
+          </a:lnRef>
+          <a:fillRef idx="1">
+            <a:schemeClr val="accent1"/>
+          </a:fillRef>
+          <a:effectRef idx="0">
+            <a:schemeClr val="accent1"/>
+          </a:effectRef>
+          <a:fontRef idx="minor">
+            <a:schemeClr val="lt1"/>
+          </a:fontRef>
+        </p:style>
+        <p:txBody>
+          <a:bodyPr rtlCol="0" anchor="ctr"/>
+          <a:lstStyle/>
+          <a:p>
+            <a:pPr algn="ctr"/>
+            <a:endParaRPr lang="en-US"/>
+          </a:p>
+        </p:txBody>
+      </p:sp>
+      <p:sp>
+        <p:nvSpPr>
+          <p:cNvPr id="8" name="Arrow: Up 7">
+            <a:extLst>
+              <a:ext uri="{FF2B5EF4-FFF2-40B4-BE49-F238E27FC236}">
+                <a16:creationId xmlns:a16="http://schemas.microsoft.com/office/drawing/2014/main" id="{921A9EDD-7DA2-4CCD-8A40-D1A7B3E877DB}"/>
+              </a:ext>
+            </a:extLst>
+          </p:cNvPr>
+          <p:cNvSpPr/>
+          <p:nvPr/>
+        </p:nvSpPr>
+        <p:spPr>
+          <a:xfrm>
+            <a:off x="7064828" y="1057275"/>
+            <a:ext cx="277585" cy="342900"/>
+          </a:xfrm>
+          <a:prstGeom prst="upArrow">
+            <a:avLst>
+              <a:gd name="adj1" fmla="val 50000"/>
+              <a:gd name="adj2" fmla="val 73530"/>
+            </a:avLst>
+          </a:prstGeom>
+          <a:solidFill>
+            <a:srgbClr val="FF0000"/>
+          </a:solidFill>
+          <a:ln>
+            <a:noFill/>
+          </a:ln>
+        </p:spPr>
+        <p:style>
+          <a:lnRef idx="2">
+            <a:schemeClr val="accent1">
+              <a:shade val="50000"/>
+            </a:schemeClr>
+          </a:lnRef>
+          <a:fillRef idx="1">
+            <a:schemeClr val="accent1"/>
+          </a:fillRef>
+          <a:effectRef idx="0">
+            <a:schemeClr val="accent1"/>
+          </a:effectRef>
+          <a:fontRef idx="minor">
+            <a:schemeClr val="lt1"/>
+          </a:fontRef>
+        </p:style>
+        <p:txBody>
+          <a:bodyPr rtlCol="0" anchor="ctr"/>
+          <a:lstStyle/>
+          <a:p>
+            <a:pPr algn="ctr"/>
+            <a:endParaRPr lang="en-US"/>
+          </a:p>
+        </p:txBody>
+      </p:sp>
+      <p:sp>
+        <p:nvSpPr>
+          <p:cNvPr id="9" name="Arrow: Up 8">
+            <a:extLst>
+              <a:ext uri="{FF2B5EF4-FFF2-40B4-BE49-F238E27FC236}">
+                <a16:creationId xmlns:a16="http://schemas.microsoft.com/office/drawing/2014/main" id="{D34D2A31-D912-4449-9DD5-708B231DADEA}"/>
+              </a:ext>
+            </a:extLst>
+          </p:cNvPr>
+          <p:cNvSpPr/>
+          <p:nvPr/>
+        </p:nvSpPr>
+        <p:spPr>
+          <a:xfrm rot="10800000">
+            <a:off x="9654267" y="1057275"/>
+            <a:ext cx="277585" cy="342900"/>
+          </a:xfrm>
+          <a:prstGeom prst="upArrow">
+            <a:avLst/>
+          </a:prstGeom>
+          <a:solidFill>
+            <a:srgbClr val="FF0000"/>
+          </a:solidFill>
+          <a:ln>
+            <a:noFill/>
+          </a:ln>
+        </p:spPr>
+        <p:style>
+          <a:lnRef idx="2">
+            <a:schemeClr val="accent1">
+              <a:shade val="50000"/>
+            </a:schemeClr>
+          </a:lnRef>
+          <a:fillRef idx="1">
+            <a:schemeClr val="accent1"/>
+          </a:fillRef>
+          <a:effectRef idx="0">
+            <a:schemeClr val="accent1"/>
+          </a:effectRef>
+          <a:fontRef idx="minor">
+            <a:schemeClr val="lt1"/>
+          </a:fontRef>
+        </p:style>
+        <p:txBody>
+          <a:bodyPr rtlCol="0" anchor="ctr"/>
+          <a:lstStyle/>
+          <a:p>
+            <a:pPr algn="ctr"/>
+            <a:endParaRPr lang="en-US"/>
+          </a:p>
+        </p:txBody>
+      </p:sp>
+    </p:spTree>
+    <p:extLst>
+      <p:ext uri="{BB962C8B-B14F-4D97-AF65-F5344CB8AC3E}">
+        <p14:creationId xmlns:p14="http://schemas.microsoft.com/office/powerpoint/2010/main" val="2043703753"/>
+      </p:ext>
+    </p:extLst>
+  </p:cSld>
+  <p:clrMapOvr>
+    <a:masterClrMapping/>
+  </p:clrMapOvr>
+</p:sld>
+</file>
+
+<file path=ppt/slides/slide21.xml><?xml version="1.0" encoding="utf-8"?>
+<p:sld xmlns:a="http://schemas.openxmlformats.org/drawingml/2006/main" xmlns:r="http://schemas.openxmlformats.org/officeDocument/2006/relationships" xmlns:p="http://schemas.openxmlformats.org/presentationml/2006/main">
+  <p:cSld>
+    <p:spTree>
+      <p:nvGrpSpPr>
+        <p:cNvPr id="1" name=""/>
+        <p:cNvGrpSpPr/>
+        <p:nvPr/>
+      </p:nvGrpSpPr>
+      <p:grpSpPr>
+        <a:xfrm>
+          <a:off x="0" y="0"/>
+          <a:ext cx="0" cy="0"/>
+          <a:chOff x="0" y="0"/>
+          <a:chExt cx="0" cy="0"/>
+        </a:xfrm>
+      </p:grpSpPr>
+      <p:sp>
+        <p:nvSpPr>
+          <p:cNvPr id="2" name="Title 1">
+            <a:extLst>
+              <a:ext uri="{FF2B5EF4-FFF2-40B4-BE49-F238E27FC236}">
+                <a16:creationId xmlns:a16="http://schemas.microsoft.com/office/drawing/2014/main" id="{5DB94126-3787-40C3-B8A7-5EE132B3E90A}"/>
+              </a:ext>
+            </a:extLst>
+          </p:cNvPr>
+          <p:cNvSpPr>
+            <a:spLocks noGrp="1"/>
+          </p:cNvSpPr>
+          <p:nvPr>
+            <p:ph type="title"/>
+          </p:nvPr>
+        </p:nvSpPr>
+        <p:spPr/>
+        <p:txBody>
+          <a:bodyPr/>
+          <a:lstStyle/>
+          <a:p>
+            <a:r>
+              <a:rPr lang="en-US" dirty="0"/>
+              <a:t>Preliminary Results (2)</a:t>
+            </a:r>
+          </a:p>
+        </p:txBody>
+      </p:sp>
+      <p:sp>
+        <p:nvSpPr>
+          <p:cNvPr id="3" name="Content Placeholder 2">
+            <a:extLst>
+              <a:ext uri="{FF2B5EF4-FFF2-40B4-BE49-F238E27FC236}">
+                <a16:creationId xmlns:a16="http://schemas.microsoft.com/office/drawing/2014/main" id="{F0FB2854-1D5D-4AE6-90F0-188FCA3D74B6}"/>
+              </a:ext>
+            </a:extLst>
+          </p:cNvPr>
+          <p:cNvSpPr>
+            <a:spLocks noGrp="1"/>
+          </p:cNvSpPr>
+          <p:nvPr>
+            <p:ph idx="1"/>
+          </p:nvPr>
+        </p:nvSpPr>
+        <p:spPr/>
+        <p:txBody>
+          <a:bodyPr/>
+          <a:lstStyle/>
+          <a:p>
+            <a:r>
+              <a:rPr lang="en-US" dirty="0"/>
+              <a:t>Aggregate cuts based on </a:t>
+            </a:r>
+            <a:r>
+              <a:rPr lang="en-US" b="1" i="1" dirty="0"/>
+              <a:t>some</a:t>
+            </a:r>
+            <a:r>
+              <a:rPr lang="en-US" dirty="0"/>
+              <a:t> </a:t>
+            </a:r>
+            <a:r>
+              <a:rPr lang="en-US" b="1" dirty="0"/>
+              <a:t>dual solutions </a:t>
+            </a:r>
+            <a:r>
+              <a:rPr lang="en-US" dirty="0"/>
+              <a:t>and </a:t>
+            </a:r>
+            <a:r>
+              <a:rPr lang="en-US" b="1" dirty="0"/>
+              <a:t>objective values</a:t>
+            </a:r>
+          </a:p>
+        </p:txBody>
+      </p:sp>
+    </p:spTree>
+    <p:extLst>
+      <p:ext uri="{BB962C8B-B14F-4D97-AF65-F5344CB8AC3E}">
+        <p14:creationId xmlns:p14="http://schemas.microsoft.com/office/powerpoint/2010/main" val="3087685060"/>
+      </p:ext>
+    </p:extLst>
+  </p:cSld>
+  <p:clrMapOvr>
+    <a:masterClrMapping/>
+  </p:clrMapOvr>
+</p:sld>
+</file>
+
+<file path=ppt/slides/slide22.xml><?xml version="1.0" encoding="utf-8"?>
+<p:sld xmlns:a="http://schemas.openxmlformats.org/drawingml/2006/main" xmlns:r="http://schemas.openxmlformats.org/officeDocument/2006/relationships" xmlns:p="http://schemas.openxmlformats.org/presentationml/2006/main">
+  <p:cSld>
+    <p:spTree>
+      <p:nvGrpSpPr>
+        <p:cNvPr id="1" name=""/>
+        <p:cNvGrpSpPr/>
+        <p:nvPr/>
+      </p:nvGrpSpPr>
+      <p:grpSpPr>
+        <a:xfrm>
+          <a:off x="0" y="0"/>
+          <a:ext cx="0" cy="0"/>
+          <a:chOff x="0" y="0"/>
+          <a:chExt cx="0" cy="0"/>
+        </a:xfrm>
+      </p:grpSpPr>
+      <p:sp>
+        <p:nvSpPr>
+          <p:cNvPr id="2" name="Title 1">
+            <a:extLst>
+              <a:ext uri="{FF2B5EF4-FFF2-40B4-BE49-F238E27FC236}">
+                <a16:creationId xmlns:a16="http://schemas.microsoft.com/office/drawing/2014/main" id="{258757B9-1C3C-43C7-91A5-CE5BFEEF90E9}"/>
+              </a:ext>
+            </a:extLst>
+          </p:cNvPr>
+          <p:cNvSpPr>
+            <a:spLocks noGrp="1"/>
+          </p:cNvSpPr>
+          <p:nvPr>
+            <p:ph type="title"/>
+          </p:nvPr>
+        </p:nvSpPr>
+        <p:spPr/>
+        <p:txBody>
+          <a:bodyPr/>
+          <a:lstStyle/>
+          <a:p>
+            <a:r>
+              <a:rPr lang="en-CA" dirty="0"/>
+              <a:t>Computational Results (K=500)</a:t>
+            </a:r>
+            <a:endParaRPr lang="en-US" dirty="0"/>
+          </a:p>
+        </p:txBody>
+      </p:sp>
+      <p:sp>
+        <p:nvSpPr>
+          <p:cNvPr id="12" name="TextBox 11">
+            <a:extLst>
+              <a:ext uri="{FF2B5EF4-FFF2-40B4-BE49-F238E27FC236}">
+                <a16:creationId xmlns:a16="http://schemas.microsoft.com/office/drawing/2014/main" id="{910FD78C-21E2-4C40-A38D-C7AAA6F0EDCE}"/>
+              </a:ext>
+            </a:extLst>
+          </p:cNvPr>
+          <p:cNvSpPr txBox="1"/>
+          <p:nvPr/>
+        </p:nvSpPr>
+        <p:spPr>
+          <a:xfrm>
+            <a:off x="979714" y="1559379"/>
+            <a:ext cx="4400550" cy="369332"/>
+          </a:xfrm>
+          <a:prstGeom prst="rect">
+            <a:avLst/>
+          </a:prstGeom>
+          <a:noFill/>
+        </p:spPr>
+        <p:txBody>
+          <a:bodyPr wrap="square" rtlCol="0">
+            <a:spAutoFit/>
+          </a:bodyPr>
+          <a:lstStyle/>
+          <a:p>
+            <a:r>
+              <a:rPr lang="en-US" dirty="0" err="1"/>
+              <a:t>MultiCut</a:t>
+            </a:r>
+            <a:r>
+              <a:rPr lang="en-US" dirty="0"/>
+              <a:t>: 19.20 s (3-trial average)</a:t>
+            </a:r>
+          </a:p>
+        </p:txBody>
+      </p:sp>
+      <p:pic>
+        <p:nvPicPr>
+          <p:cNvPr id="14" name="Picture 13">
+            <a:extLst>
+              <a:ext uri="{FF2B5EF4-FFF2-40B4-BE49-F238E27FC236}">
+                <a16:creationId xmlns:a16="http://schemas.microsoft.com/office/drawing/2014/main" id="{CB5CE558-A4DC-4D75-8921-E2A3F82187B7}"/>
+              </a:ext>
+            </a:extLst>
+          </p:cNvPr>
+          <p:cNvPicPr>
+            <a:picLocks noChangeAspect="1"/>
+          </p:cNvPicPr>
+          <p:nvPr/>
+        </p:nvPicPr>
+        <p:blipFill>
+          <a:blip r:embed="rId2"/>
+          <a:stretch>
+            <a:fillRect/>
+          </a:stretch>
+        </p:blipFill>
+        <p:spPr>
+          <a:xfrm>
+            <a:off x="2266415" y="2562104"/>
+            <a:ext cx="7659169" cy="1733792"/>
+          </a:xfrm>
+          <a:prstGeom prst="rect">
+            <a:avLst/>
+          </a:prstGeom>
+        </p:spPr>
+      </p:pic>
+    </p:spTree>
+    <p:extLst>
+      <p:ext uri="{BB962C8B-B14F-4D97-AF65-F5344CB8AC3E}">
+        <p14:creationId xmlns:p14="http://schemas.microsoft.com/office/powerpoint/2010/main" val="2813932481"/>
+      </p:ext>
+    </p:extLst>
+  </p:cSld>
+  <p:clrMapOvr>
+    <a:masterClrMapping/>
+  </p:clrMapOvr>
+</p:sld>
+</file>
+
+<file path=ppt/slides/slide23.xml><?xml version="1.0" encoding="utf-8"?>
+<p:sld xmlns:a="http://schemas.openxmlformats.org/drawingml/2006/main" xmlns:r="http://schemas.openxmlformats.org/officeDocument/2006/relationships" xmlns:p="http://schemas.openxmlformats.org/presentationml/2006/main">
+  <p:cSld>
+    <p:spTree>
+      <p:nvGrpSpPr>
+        <p:cNvPr id="1" name=""/>
+        <p:cNvGrpSpPr/>
+        <p:nvPr/>
+      </p:nvGrpSpPr>
+      <p:grpSpPr>
+        <a:xfrm>
+          <a:off x="0" y="0"/>
+          <a:ext cx="0" cy="0"/>
+          <a:chOff x="0" y="0"/>
+          <a:chExt cx="0" cy="0"/>
+        </a:xfrm>
+      </p:grpSpPr>
+      <p:sp>
+        <p:nvSpPr>
+          <p:cNvPr id="2" name="Title 1">
+            <a:extLst>
+              <a:ext uri="{FF2B5EF4-FFF2-40B4-BE49-F238E27FC236}">
+                <a16:creationId xmlns:a16="http://schemas.microsoft.com/office/drawing/2014/main" id="{258757B9-1C3C-43C7-91A5-CE5BFEEF90E9}"/>
+              </a:ext>
+            </a:extLst>
+          </p:cNvPr>
+          <p:cNvSpPr>
+            <a:spLocks noGrp="1"/>
+          </p:cNvSpPr>
+          <p:nvPr>
+            <p:ph type="title"/>
+          </p:nvPr>
+        </p:nvSpPr>
+        <p:spPr/>
+        <p:txBody>
+          <a:bodyPr/>
+          <a:lstStyle/>
+          <a:p>
+            <a:r>
+              <a:rPr lang="en-CA" dirty="0"/>
+              <a:t>Computational Results (K=3000)</a:t>
+            </a:r>
+            <a:endParaRPr lang="en-US" dirty="0"/>
+          </a:p>
+        </p:txBody>
+      </p:sp>
+      <p:pic>
+        <p:nvPicPr>
+          <p:cNvPr id="4" name="Picture 3">
+            <a:extLst>
+              <a:ext uri="{FF2B5EF4-FFF2-40B4-BE49-F238E27FC236}">
+                <a16:creationId xmlns:a16="http://schemas.microsoft.com/office/drawing/2014/main" id="{EA0E0D2B-7866-4370-BFD0-86994DC7D0F0}"/>
+              </a:ext>
+            </a:extLst>
+          </p:cNvPr>
+          <p:cNvPicPr>
+            <a:picLocks noChangeAspect="1"/>
+          </p:cNvPicPr>
+          <p:nvPr/>
+        </p:nvPicPr>
+        <p:blipFill>
+          <a:blip r:embed="rId2"/>
+          <a:stretch>
+            <a:fillRect/>
+          </a:stretch>
+        </p:blipFill>
+        <p:spPr>
+          <a:xfrm>
+            <a:off x="2180678" y="3143210"/>
+            <a:ext cx="7830643" cy="571580"/>
+          </a:xfrm>
+          <a:prstGeom prst="rect">
+            <a:avLst/>
+          </a:prstGeom>
+        </p:spPr>
+      </p:pic>
+      <p:sp>
+        <p:nvSpPr>
+          <p:cNvPr id="8" name="TextBox 7">
+            <a:extLst>
+              <a:ext uri="{FF2B5EF4-FFF2-40B4-BE49-F238E27FC236}">
+                <a16:creationId xmlns:a16="http://schemas.microsoft.com/office/drawing/2014/main" id="{84775497-1C68-4CE9-A378-845F0C83A7B3}"/>
+              </a:ext>
+            </a:extLst>
+          </p:cNvPr>
+          <p:cNvSpPr txBox="1"/>
+          <p:nvPr/>
+        </p:nvSpPr>
+        <p:spPr>
+          <a:xfrm>
+            <a:off x="979714" y="1559379"/>
+            <a:ext cx="4400550" cy="369332"/>
+          </a:xfrm>
+          <a:prstGeom prst="rect">
+            <a:avLst/>
+          </a:prstGeom>
+          <a:noFill/>
+        </p:spPr>
+        <p:txBody>
+          <a:bodyPr wrap="square" rtlCol="0">
+            <a:spAutoFit/>
+          </a:bodyPr>
+          <a:lstStyle/>
+          <a:p>
+            <a:r>
+              <a:rPr lang="en-US" dirty="0" err="1"/>
+              <a:t>MultiCut</a:t>
+            </a:r>
+            <a:r>
+              <a:rPr lang="en-US" dirty="0"/>
+              <a:t>: 142.10 s (3-trial average)</a:t>
+            </a:r>
+          </a:p>
+        </p:txBody>
+      </p:sp>
+    </p:spTree>
+    <p:extLst>
+      <p:ext uri="{BB962C8B-B14F-4D97-AF65-F5344CB8AC3E}">
+        <p14:creationId xmlns:p14="http://schemas.microsoft.com/office/powerpoint/2010/main" val="1087487173"/>
+      </p:ext>
+    </p:extLst>
+  </p:cSld>
+  <p:clrMapOvr>
+    <a:masterClrMapping/>
+  </p:clrMapOvr>
+</p:sld>
+</file>
+
+<file path=ppt/slides/slide24.xml><?xml version="1.0" encoding="utf-8"?>
+<p:sld xmlns:a="http://schemas.openxmlformats.org/drawingml/2006/main" xmlns:r="http://schemas.openxmlformats.org/officeDocument/2006/relationships" xmlns:p="http://schemas.openxmlformats.org/presentationml/2006/main">
+  <p:cSld>
+    <p:spTree>
+      <p:nvGrpSpPr>
+        <p:cNvPr id="1" name=""/>
+        <p:cNvGrpSpPr/>
+        <p:nvPr/>
+      </p:nvGrpSpPr>
+      <p:grpSpPr>
+        <a:xfrm>
+          <a:off x="0" y="0"/>
+          <a:ext cx="0" cy="0"/>
+          <a:chOff x="0" y="0"/>
+          <a:chExt cx="0" cy="0"/>
+        </a:xfrm>
+      </p:grpSpPr>
+      <p:sp>
+        <p:nvSpPr>
+          <p:cNvPr id="2" name="Title 1">
+            <a:extLst>
+              <a:ext uri="{FF2B5EF4-FFF2-40B4-BE49-F238E27FC236}">
+                <a16:creationId xmlns:a16="http://schemas.microsoft.com/office/drawing/2014/main" id="{258757B9-1C3C-43C7-91A5-CE5BFEEF90E9}"/>
+              </a:ext>
+            </a:extLst>
+          </p:cNvPr>
+          <p:cNvSpPr>
+            <a:spLocks noGrp="1"/>
+          </p:cNvSpPr>
+          <p:nvPr>
+            <p:ph type="title"/>
+          </p:nvPr>
+        </p:nvSpPr>
+        <p:spPr/>
+        <p:txBody>
+          <a:bodyPr/>
+          <a:lstStyle/>
+          <a:p>
+            <a:r>
+              <a:rPr lang="en-CA" dirty="0"/>
+              <a:t>Computational Results (K=5000)</a:t>
+            </a:r>
+            <a:endParaRPr lang="en-US" dirty="0"/>
+          </a:p>
+        </p:txBody>
+      </p:sp>
+      <p:pic>
+        <p:nvPicPr>
+          <p:cNvPr id="5" name="Picture 4">
+            <a:extLst>
+              <a:ext uri="{FF2B5EF4-FFF2-40B4-BE49-F238E27FC236}">
+                <a16:creationId xmlns:a16="http://schemas.microsoft.com/office/drawing/2014/main" id="{32AF43D5-8F15-4947-8B01-AF5EB5D1B7BA}"/>
+              </a:ext>
+            </a:extLst>
+          </p:cNvPr>
+          <p:cNvPicPr>
+            <a:picLocks noChangeAspect="1"/>
+          </p:cNvPicPr>
+          <p:nvPr/>
+        </p:nvPicPr>
+        <p:blipFill>
+          <a:blip r:embed="rId2"/>
+          <a:stretch>
+            <a:fillRect/>
+          </a:stretch>
+        </p:blipFill>
+        <p:spPr>
+          <a:xfrm>
+            <a:off x="2123520" y="1690688"/>
+            <a:ext cx="7944959" cy="4353533"/>
+          </a:xfrm>
+          <a:prstGeom prst="rect">
+            <a:avLst/>
+          </a:prstGeom>
+        </p:spPr>
+      </p:pic>
+      <p:cxnSp>
+        <p:nvCxnSpPr>
+          <p:cNvPr id="7" name="Straight Connector 6">
+            <a:extLst>
+              <a:ext uri="{FF2B5EF4-FFF2-40B4-BE49-F238E27FC236}">
+                <a16:creationId xmlns:a16="http://schemas.microsoft.com/office/drawing/2014/main" id="{1950DCCF-5840-4597-913B-5139B1128F53}"/>
+              </a:ext>
+            </a:extLst>
+          </p:cNvPr>
+          <p:cNvCxnSpPr/>
+          <p:nvPr/>
+        </p:nvCxnSpPr>
+        <p:spPr>
+          <a:xfrm>
+            <a:off x="1779814" y="2563584"/>
+            <a:ext cx="8727622" cy="0"/>
+          </a:xfrm>
+          <a:prstGeom prst="line">
+            <a:avLst/>
+          </a:prstGeom>
+          <a:ln>
+            <a:solidFill>
+              <a:srgbClr val="FF0000"/>
+            </a:solidFill>
+          </a:ln>
+        </p:spPr>
+        <p:style>
+          <a:lnRef idx="1">
+            <a:schemeClr val="accent1"/>
+          </a:lnRef>
+          <a:fillRef idx="0">
+            <a:schemeClr val="accent1"/>
+          </a:fillRef>
+          <a:effectRef idx="0">
+            <a:schemeClr val="accent1"/>
+          </a:effectRef>
+          <a:fontRef idx="minor">
+            <a:schemeClr val="tx1"/>
+          </a:fontRef>
+        </p:style>
+      </p:cxnSp>
+      <p:cxnSp>
+        <p:nvCxnSpPr>
+          <p:cNvPr id="9" name="Straight Connector 8">
+            <a:extLst>
+              <a:ext uri="{FF2B5EF4-FFF2-40B4-BE49-F238E27FC236}">
+                <a16:creationId xmlns:a16="http://schemas.microsoft.com/office/drawing/2014/main" id="{2EB70546-43F1-43B5-8190-ED6E77123E11}"/>
+              </a:ext>
+            </a:extLst>
+          </p:cNvPr>
+          <p:cNvCxnSpPr/>
+          <p:nvPr/>
+        </p:nvCxnSpPr>
+        <p:spPr>
+          <a:xfrm>
+            <a:off x="1779814" y="3409949"/>
+            <a:ext cx="8727622" cy="0"/>
+          </a:xfrm>
+          <a:prstGeom prst="line">
+            <a:avLst/>
+          </a:prstGeom>
+          <a:ln>
+            <a:solidFill>
+              <a:srgbClr val="FF0000"/>
+            </a:solidFill>
+          </a:ln>
+        </p:spPr>
+        <p:style>
+          <a:lnRef idx="1">
+            <a:schemeClr val="accent1"/>
+          </a:lnRef>
+          <a:fillRef idx="0">
+            <a:schemeClr val="accent1"/>
+          </a:fillRef>
+          <a:effectRef idx="0">
+            <a:schemeClr val="accent1"/>
+          </a:effectRef>
+          <a:fontRef idx="minor">
+            <a:schemeClr val="tx1"/>
+          </a:fontRef>
+        </p:style>
+      </p:cxnSp>
+      <p:cxnSp>
+        <p:nvCxnSpPr>
+          <p:cNvPr id="10" name="Straight Connector 9">
+            <a:extLst>
+              <a:ext uri="{FF2B5EF4-FFF2-40B4-BE49-F238E27FC236}">
+                <a16:creationId xmlns:a16="http://schemas.microsoft.com/office/drawing/2014/main" id="{6A1F81A0-FD71-4CFF-AF47-7FC86DDE24E6}"/>
+              </a:ext>
+            </a:extLst>
+          </p:cNvPr>
+          <p:cNvCxnSpPr/>
+          <p:nvPr/>
+        </p:nvCxnSpPr>
+        <p:spPr>
+          <a:xfrm>
+            <a:off x="1779814" y="4264478"/>
+            <a:ext cx="8727622" cy="0"/>
+          </a:xfrm>
+          <a:prstGeom prst="line">
+            <a:avLst/>
+          </a:prstGeom>
+          <a:ln>
+            <a:solidFill>
+              <a:srgbClr val="FF0000"/>
+            </a:solidFill>
+          </a:ln>
+        </p:spPr>
+        <p:style>
+          <a:lnRef idx="1">
+            <a:schemeClr val="accent1"/>
+          </a:lnRef>
+          <a:fillRef idx="0">
+            <a:schemeClr val="accent1"/>
+          </a:fillRef>
+          <a:effectRef idx="0">
+            <a:schemeClr val="accent1"/>
+          </a:effectRef>
+          <a:fontRef idx="minor">
+            <a:schemeClr val="tx1"/>
+          </a:fontRef>
+        </p:style>
+      </p:cxnSp>
+      <p:cxnSp>
+        <p:nvCxnSpPr>
+          <p:cNvPr id="11" name="Straight Connector 10">
+            <a:extLst>
+              <a:ext uri="{FF2B5EF4-FFF2-40B4-BE49-F238E27FC236}">
+                <a16:creationId xmlns:a16="http://schemas.microsoft.com/office/drawing/2014/main" id="{E598692D-88FE-4874-9FFA-E8B483E1CD00}"/>
+              </a:ext>
+            </a:extLst>
+          </p:cNvPr>
+          <p:cNvCxnSpPr/>
+          <p:nvPr/>
+        </p:nvCxnSpPr>
+        <p:spPr>
+          <a:xfrm>
+            <a:off x="1779814" y="5129892"/>
+            <a:ext cx="8727622" cy="0"/>
+          </a:xfrm>
+          <a:prstGeom prst="line">
+            <a:avLst/>
+          </a:prstGeom>
+          <a:ln>
+            <a:solidFill>
+              <a:srgbClr val="FF0000"/>
+            </a:solidFill>
+          </a:ln>
+        </p:spPr>
+        <p:style>
+          <a:lnRef idx="1">
+            <a:schemeClr val="accent1"/>
+          </a:lnRef>
+          <a:fillRef idx="0">
+            <a:schemeClr val="accent1"/>
+          </a:fillRef>
+          <a:effectRef idx="0">
+            <a:schemeClr val="accent1"/>
+          </a:effectRef>
+          <a:fontRef idx="minor">
+            <a:schemeClr val="tx1"/>
+          </a:fontRef>
+        </p:style>
+      </p:cxnSp>
+      <p:sp>
+        <p:nvSpPr>
+          <p:cNvPr id="12" name="TextBox 11">
+            <a:extLst>
+              <a:ext uri="{FF2B5EF4-FFF2-40B4-BE49-F238E27FC236}">
+                <a16:creationId xmlns:a16="http://schemas.microsoft.com/office/drawing/2014/main" id="{10FC8995-3CCF-45E4-BF93-5AF6C9B82A87}"/>
+              </a:ext>
+            </a:extLst>
+          </p:cNvPr>
+          <p:cNvSpPr txBox="1"/>
+          <p:nvPr/>
+        </p:nvSpPr>
+        <p:spPr>
+          <a:xfrm>
+            <a:off x="155120" y="1960686"/>
+            <a:ext cx="1624693" cy="369332"/>
+          </a:xfrm>
+          <a:prstGeom prst="rect">
+            <a:avLst/>
+          </a:prstGeom>
+          <a:noFill/>
+        </p:spPr>
+        <p:txBody>
+          <a:bodyPr wrap="square" rtlCol="0">
+            <a:spAutoFit/>
+          </a:bodyPr>
+          <a:lstStyle/>
+          <a:p>
+            <a:pPr algn="ctr"/>
+            <a:r>
+              <a:rPr lang="en-US" dirty="0">
+                <a:solidFill>
+                  <a:srgbClr val="FF0000"/>
+                </a:solidFill>
+              </a:rPr>
+              <a:t>Seed # = 1</a:t>
+            </a:r>
+          </a:p>
+        </p:txBody>
+      </p:sp>
+      <p:sp>
+        <p:nvSpPr>
+          <p:cNvPr id="13" name="TextBox 12">
+            <a:extLst>
+              <a:ext uri="{FF2B5EF4-FFF2-40B4-BE49-F238E27FC236}">
+                <a16:creationId xmlns:a16="http://schemas.microsoft.com/office/drawing/2014/main" id="{D074106F-ABDA-4E0A-B3B9-90AFC6ECB1D7}"/>
+              </a:ext>
+            </a:extLst>
+          </p:cNvPr>
+          <p:cNvSpPr txBox="1"/>
+          <p:nvPr/>
+        </p:nvSpPr>
+        <p:spPr>
+          <a:xfrm>
+            <a:off x="155120" y="2685317"/>
+            <a:ext cx="1624693" cy="369332"/>
+          </a:xfrm>
+          <a:prstGeom prst="rect">
+            <a:avLst/>
+          </a:prstGeom>
+          <a:noFill/>
+        </p:spPr>
+        <p:txBody>
+          <a:bodyPr wrap="square" rtlCol="0">
+            <a:spAutoFit/>
+          </a:bodyPr>
+          <a:lstStyle/>
+          <a:p>
+            <a:pPr algn="ctr"/>
+            <a:r>
+              <a:rPr lang="en-US" dirty="0">
+                <a:solidFill>
+                  <a:srgbClr val="FF0000"/>
+                </a:solidFill>
+              </a:rPr>
+              <a:t>Seed # = 2</a:t>
+            </a:r>
+          </a:p>
+        </p:txBody>
+      </p:sp>
+      <p:sp>
+        <p:nvSpPr>
+          <p:cNvPr id="14" name="TextBox 13">
+            <a:extLst>
+              <a:ext uri="{FF2B5EF4-FFF2-40B4-BE49-F238E27FC236}">
+                <a16:creationId xmlns:a16="http://schemas.microsoft.com/office/drawing/2014/main" id="{B3CC7E21-870B-45B7-BAEF-42F1C1DB9EDD}"/>
+              </a:ext>
+            </a:extLst>
+          </p:cNvPr>
+          <p:cNvSpPr txBox="1"/>
+          <p:nvPr/>
+        </p:nvSpPr>
+        <p:spPr>
+          <a:xfrm>
+            <a:off x="155120" y="3531681"/>
+            <a:ext cx="1624693" cy="369332"/>
+          </a:xfrm>
+          <a:prstGeom prst="rect">
+            <a:avLst/>
+          </a:prstGeom>
+          <a:noFill/>
+        </p:spPr>
+        <p:txBody>
+          <a:bodyPr wrap="square" rtlCol="0">
+            <a:spAutoFit/>
+          </a:bodyPr>
+          <a:lstStyle/>
+          <a:p>
+            <a:pPr algn="ctr"/>
+            <a:r>
+              <a:rPr lang="en-US" dirty="0">
+                <a:solidFill>
+                  <a:srgbClr val="FF0000"/>
+                </a:solidFill>
+              </a:rPr>
+              <a:t>Seed # = 3</a:t>
+            </a:r>
+          </a:p>
+        </p:txBody>
+      </p:sp>
+      <p:sp>
+        <p:nvSpPr>
+          <p:cNvPr id="15" name="TextBox 14">
+            <a:extLst>
+              <a:ext uri="{FF2B5EF4-FFF2-40B4-BE49-F238E27FC236}">
+                <a16:creationId xmlns:a16="http://schemas.microsoft.com/office/drawing/2014/main" id="{3C201CC7-39F8-495B-B3B3-32268B20EFFA}"/>
+              </a:ext>
+            </a:extLst>
+          </p:cNvPr>
+          <p:cNvSpPr txBox="1"/>
+          <p:nvPr/>
+        </p:nvSpPr>
+        <p:spPr>
+          <a:xfrm>
+            <a:off x="155120" y="4408578"/>
+            <a:ext cx="1624693" cy="369332"/>
+          </a:xfrm>
+          <a:prstGeom prst="rect">
+            <a:avLst/>
+          </a:prstGeom>
+          <a:noFill/>
+        </p:spPr>
+        <p:txBody>
+          <a:bodyPr wrap="square" rtlCol="0">
+            <a:spAutoFit/>
+          </a:bodyPr>
+          <a:lstStyle/>
+          <a:p>
+            <a:pPr algn="ctr"/>
+            <a:r>
+              <a:rPr lang="en-US" dirty="0">
+                <a:solidFill>
+                  <a:srgbClr val="FF0000"/>
+                </a:solidFill>
+              </a:rPr>
+              <a:t>Seed # = 4</a:t>
+            </a:r>
+          </a:p>
+        </p:txBody>
+      </p:sp>
+      <p:sp>
+        <p:nvSpPr>
+          <p:cNvPr id="16" name="TextBox 15">
+            <a:extLst>
+              <a:ext uri="{FF2B5EF4-FFF2-40B4-BE49-F238E27FC236}">
+                <a16:creationId xmlns:a16="http://schemas.microsoft.com/office/drawing/2014/main" id="{CF41700F-6E58-4691-842E-92AD8611C0A0}"/>
+              </a:ext>
+            </a:extLst>
+          </p:cNvPr>
+          <p:cNvSpPr txBox="1"/>
+          <p:nvPr/>
+        </p:nvSpPr>
+        <p:spPr>
+          <a:xfrm>
+            <a:off x="155120" y="5232574"/>
+            <a:ext cx="1624693" cy="369332"/>
+          </a:xfrm>
+          <a:prstGeom prst="rect">
+            <a:avLst/>
+          </a:prstGeom>
+          <a:noFill/>
+        </p:spPr>
+        <p:txBody>
+          <a:bodyPr wrap="square" rtlCol="0">
+            <a:spAutoFit/>
+          </a:bodyPr>
+          <a:lstStyle/>
+          <a:p>
+            <a:pPr algn="ctr"/>
+            <a:r>
+              <a:rPr lang="en-US" dirty="0">
+                <a:solidFill>
+                  <a:srgbClr val="FF0000"/>
+                </a:solidFill>
+              </a:rPr>
+              <a:t>Seed # = 5</a:t>
+            </a:r>
+          </a:p>
+        </p:txBody>
+      </p:sp>
+    </p:spTree>
+    <p:extLst>
+      <p:ext uri="{BB962C8B-B14F-4D97-AF65-F5344CB8AC3E}">
+        <p14:creationId xmlns:p14="http://schemas.microsoft.com/office/powerpoint/2010/main" val="2467276268"/>
+      </p:ext>
+    </p:extLst>
+  </p:cSld>
+  <p:clrMapOvr>
+    <a:masterClrMapping/>
+  </p:clrMapOvr>
+</p:sld>
+</file>
+
+<file path=ppt/slides/slide25.xml><?xml version="1.0" encoding="utf-8"?>
+<p:sld xmlns:a="http://schemas.openxmlformats.org/drawingml/2006/main" xmlns:r="http://schemas.openxmlformats.org/officeDocument/2006/relationships" xmlns:p="http://schemas.openxmlformats.org/presentationml/2006/main">
+  <p:cSld>
+    <p:spTree>
+      <p:nvGrpSpPr>
+        <p:cNvPr id="1" name=""/>
+        <p:cNvGrpSpPr/>
+        <p:nvPr/>
+      </p:nvGrpSpPr>
+      <p:grpSpPr>
+        <a:xfrm>
+          <a:off x="0" y="0"/>
+          <a:ext cx="0" cy="0"/>
+          <a:chOff x="0" y="0"/>
+          <a:chExt cx="0" cy="0"/>
+        </a:xfrm>
+      </p:grpSpPr>
+      <p:sp>
+        <p:nvSpPr>
+          <p:cNvPr id="2" name="Title 1">
+            <a:extLst>
+              <a:ext uri="{FF2B5EF4-FFF2-40B4-BE49-F238E27FC236}">
+                <a16:creationId xmlns:a16="http://schemas.microsoft.com/office/drawing/2014/main" id="{258757B9-1C3C-43C7-91A5-CE5BFEEF90E9}"/>
+              </a:ext>
+            </a:extLst>
+          </p:cNvPr>
+          <p:cNvSpPr>
+            <a:spLocks noGrp="1"/>
+          </p:cNvSpPr>
+          <p:nvPr>
+            <p:ph type="title"/>
+          </p:nvPr>
+        </p:nvSpPr>
+        <p:spPr/>
+        <p:txBody>
+          <a:bodyPr/>
+          <a:lstStyle/>
+          <a:p>
+            <a:r>
+              <a:rPr lang="en-CA" dirty="0"/>
+              <a:t>Computational Results (K=5000)</a:t>
+            </a:r>
+            <a:endParaRPr lang="en-US" dirty="0"/>
+          </a:p>
+        </p:txBody>
+      </p:sp>
+      <p:sp>
+        <p:nvSpPr>
+          <p:cNvPr id="8" name="TextBox 7">
+            <a:extLst>
+              <a:ext uri="{FF2B5EF4-FFF2-40B4-BE49-F238E27FC236}">
+                <a16:creationId xmlns:a16="http://schemas.microsoft.com/office/drawing/2014/main" id="{84775497-1C68-4CE9-A378-845F0C83A7B3}"/>
+              </a:ext>
+            </a:extLst>
+          </p:cNvPr>
+          <p:cNvSpPr txBox="1"/>
+          <p:nvPr/>
+        </p:nvSpPr>
+        <p:spPr>
+          <a:xfrm>
+            <a:off x="979714" y="1559379"/>
+            <a:ext cx="4400550" cy="369332"/>
+          </a:xfrm>
+          <a:prstGeom prst="rect">
+            <a:avLst/>
+          </a:prstGeom>
+          <a:noFill/>
+        </p:spPr>
+        <p:txBody>
+          <a:bodyPr wrap="square" rtlCol="0">
+            <a:spAutoFit/>
+          </a:bodyPr>
+          <a:lstStyle/>
+          <a:p>
+            <a:r>
+              <a:rPr lang="en-US" dirty="0" err="1"/>
+              <a:t>MultiCut</a:t>
+            </a:r>
+            <a:r>
+              <a:rPr lang="en-US" dirty="0"/>
+              <a:t>: 275.98 s (seed #: 5)</a:t>
+            </a:r>
+          </a:p>
+        </p:txBody>
+      </p:sp>
+      <p:pic>
+        <p:nvPicPr>
+          <p:cNvPr id="5" name="Picture 4">
+            <a:extLst>
+              <a:ext uri="{FF2B5EF4-FFF2-40B4-BE49-F238E27FC236}">
+                <a16:creationId xmlns:a16="http://schemas.microsoft.com/office/drawing/2014/main" id="{D0A98566-F895-4410-917E-0F818E85CCEC}"/>
+              </a:ext>
+            </a:extLst>
+          </p:cNvPr>
+          <p:cNvPicPr>
+            <a:picLocks noChangeAspect="1"/>
+          </p:cNvPicPr>
+          <p:nvPr/>
+        </p:nvPicPr>
+        <p:blipFill>
+          <a:blip r:embed="rId2"/>
+          <a:stretch>
+            <a:fillRect/>
+          </a:stretch>
+        </p:blipFill>
+        <p:spPr>
+          <a:xfrm>
+            <a:off x="2171152" y="1928711"/>
+            <a:ext cx="7849695" cy="733527"/>
+          </a:xfrm>
+          <a:prstGeom prst="rect">
+            <a:avLst/>
+          </a:prstGeom>
+        </p:spPr>
+      </p:pic>
+      <p:sp>
+        <p:nvSpPr>
+          <p:cNvPr id="7" name="TextBox 6">
+            <a:extLst>
+              <a:ext uri="{FF2B5EF4-FFF2-40B4-BE49-F238E27FC236}">
+                <a16:creationId xmlns:a16="http://schemas.microsoft.com/office/drawing/2014/main" id="{917D2557-4449-480F-B2F3-97DA0BA4FBEA}"/>
+              </a:ext>
+            </a:extLst>
+          </p:cNvPr>
+          <p:cNvSpPr txBox="1"/>
+          <p:nvPr/>
+        </p:nvSpPr>
+        <p:spPr>
+          <a:xfrm>
+            <a:off x="979714" y="2889364"/>
+            <a:ext cx="4400550" cy="369332"/>
+          </a:xfrm>
+          <a:prstGeom prst="rect">
+            <a:avLst/>
+          </a:prstGeom>
+          <a:noFill/>
+        </p:spPr>
+        <p:txBody>
+          <a:bodyPr wrap="square" rtlCol="0">
+            <a:spAutoFit/>
+          </a:bodyPr>
+          <a:lstStyle/>
+          <a:p>
+            <a:r>
+              <a:rPr lang="en-US" dirty="0" err="1"/>
+              <a:t>MultiCut</a:t>
+            </a:r>
+            <a:r>
+              <a:rPr lang="en-US" dirty="0"/>
+              <a:t>: 281.63 s (seed #: 33)</a:t>
+            </a:r>
+          </a:p>
+        </p:txBody>
+      </p:sp>
+      <p:pic>
+        <p:nvPicPr>
+          <p:cNvPr id="9" name="Picture 8">
+            <a:extLst>
+              <a:ext uri="{FF2B5EF4-FFF2-40B4-BE49-F238E27FC236}">
+                <a16:creationId xmlns:a16="http://schemas.microsoft.com/office/drawing/2014/main" id="{23516B18-0F75-492C-B03F-6F0BC5B2C51A}"/>
+              </a:ext>
+            </a:extLst>
+          </p:cNvPr>
+          <p:cNvPicPr>
+            <a:picLocks noChangeAspect="1"/>
+          </p:cNvPicPr>
+          <p:nvPr/>
+        </p:nvPicPr>
+        <p:blipFill>
+          <a:blip r:embed="rId3"/>
+          <a:stretch>
+            <a:fillRect/>
+          </a:stretch>
+        </p:blipFill>
+        <p:spPr>
+          <a:xfrm>
+            <a:off x="2180677" y="3258696"/>
+            <a:ext cx="7830643" cy="752580"/>
+          </a:xfrm>
+          <a:prstGeom prst="rect">
+            <a:avLst/>
+          </a:prstGeom>
+        </p:spPr>
+      </p:pic>
+      <p:sp>
+        <p:nvSpPr>
+          <p:cNvPr id="10" name="TextBox 9">
+            <a:extLst>
+              <a:ext uri="{FF2B5EF4-FFF2-40B4-BE49-F238E27FC236}">
+                <a16:creationId xmlns:a16="http://schemas.microsoft.com/office/drawing/2014/main" id="{353B9AC5-02D9-46C3-9E91-1D0B233A6AC9}"/>
+              </a:ext>
+            </a:extLst>
+          </p:cNvPr>
+          <p:cNvSpPr txBox="1"/>
+          <p:nvPr/>
+        </p:nvSpPr>
+        <p:spPr>
+          <a:xfrm>
+            <a:off x="979714" y="4195942"/>
+            <a:ext cx="4400550" cy="369332"/>
+          </a:xfrm>
+          <a:prstGeom prst="rect">
+            <a:avLst/>
+          </a:prstGeom>
+          <a:noFill/>
+        </p:spPr>
+        <p:txBody>
+          <a:bodyPr wrap="square" rtlCol="0">
+            <a:spAutoFit/>
+          </a:bodyPr>
+          <a:lstStyle/>
+          <a:p>
+            <a:r>
+              <a:rPr lang="en-US" dirty="0" err="1"/>
+              <a:t>MultiCut</a:t>
+            </a:r>
+            <a:r>
+              <a:rPr lang="en-US" dirty="0"/>
+              <a:t>: 286.42 s (seed #: 111)</a:t>
+            </a:r>
+          </a:p>
+        </p:txBody>
+      </p:sp>
+      <p:pic>
+        <p:nvPicPr>
+          <p:cNvPr id="12" name="Picture 11">
+            <a:extLst>
+              <a:ext uri="{FF2B5EF4-FFF2-40B4-BE49-F238E27FC236}">
+                <a16:creationId xmlns:a16="http://schemas.microsoft.com/office/drawing/2014/main" id="{E6255770-B888-4173-B8AB-B23F7A9AAF3B}"/>
+              </a:ext>
+            </a:extLst>
+          </p:cNvPr>
+          <p:cNvPicPr>
+            <a:picLocks noChangeAspect="1"/>
+          </p:cNvPicPr>
+          <p:nvPr/>
+        </p:nvPicPr>
+        <p:blipFill>
+          <a:blip r:embed="rId4"/>
+          <a:stretch>
+            <a:fillRect/>
+          </a:stretch>
+        </p:blipFill>
+        <p:spPr>
+          <a:xfrm>
+            <a:off x="2171152" y="4565274"/>
+            <a:ext cx="7849695" cy="743054"/>
+          </a:xfrm>
+          <a:prstGeom prst="rect">
+            <a:avLst/>
+          </a:prstGeom>
+        </p:spPr>
+      </p:pic>
+    </p:spTree>
+    <p:extLst>
+      <p:ext uri="{BB962C8B-B14F-4D97-AF65-F5344CB8AC3E}">
+        <p14:creationId xmlns:p14="http://schemas.microsoft.com/office/powerpoint/2010/main" val="2451082592"/>
       </p:ext>
     </p:extLst>
   </p:cSld>

</xml_diff>